<commit_message>
updated lecture/lab for module 2
</commit_message>
<xml_diff>
--- a/LectureFiles/cshl/2016/RNASeq_Module2_Tutorial.pptx
+++ b/LectureFiles/cshl/2016/RNASeq_Module2_Tutorial.pptx
@@ -5,15 +5,22 @@
     <p:sldMasterId id="2147483648" r:id="rId1"/>
   </p:sldMasterIdLst>
   <p:notesMasterIdLst>
-    <p:notesMasterId r:id="rId5"/>
+    <p:notesMasterId r:id="rId12"/>
   </p:notesMasterIdLst>
   <p:handoutMasterIdLst>
-    <p:handoutMasterId r:id="rId6"/>
+    <p:handoutMasterId r:id="rId13"/>
   </p:handoutMasterIdLst>
   <p:sldIdLst>
     <p:sldId id="341" r:id="rId2"/>
     <p:sldId id="513" r:id="rId3"/>
-    <p:sldId id="512" r:id="rId4"/>
+    <p:sldId id="514" r:id="rId4"/>
+    <p:sldId id="521" r:id="rId5"/>
+    <p:sldId id="515" r:id="rId6"/>
+    <p:sldId id="517" r:id="rId7"/>
+    <p:sldId id="518" r:id="rId8"/>
+    <p:sldId id="519" r:id="rId9"/>
+    <p:sldId id="520" r:id="rId10"/>
+    <p:sldId id="512" r:id="rId11"/>
   </p:sldIdLst>
   <p:sldSz cx="9144000" cy="6858000" type="screen4x3"/>
   <p:notesSz cx="7315200" cy="9601200"/>
@@ -144,7 +151,7 @@
   </p:defaultTextStyle>
   <p:extLst>
     <p:ext uri="{EFAFB233-063F-42B5-8137-9DF3F51BA10A}">
-      <p15:sldGuideLst xmlns:p15="http://schemas.microsoft.com/office/powerpoint/2012/main">
+      <p15:sldGuideLst xmlns:p15="http://schemas.microsoft.com/office/powerpoint/2012/main" xmlns="">
         <p15:guide id="1" orient="horz" pos="2160">
           <p15:clr>
             <a:srgbClr val="A4A3A4"/>
@@ -264,7 +271,7 @@
               <a:pPr>
                 <a:defRPr/>
               </a:pPr>
-              <a:t>11/10/16</a:t>
+              <a:t>11/14/16</a:t>
             </a:fld>
             <a:endParaRPr lang="en-US"/>
           </a:p>
@@ -471,7 +478,7 @@
               <a:pPr>
                 <a:defRPr/>
               </a:pPr>
-              <a:t>11/10/16</a:t>
+              <a:t>11/14/16</a:t>
             </a:fld>
             <a:endParaRPr lang="en-US"/>
           </a:p>
@@ -799,6 +806,1286 @@
 </p:notesMaster>
 </file>
 
+<file path=ppt/notesSlides/notesSlide1.xml><?xml version="1.0" encoding="utf-8"?>
+<p:notes xmlns:a="http://schemas.openxmlformats.org/drawingml/2006/main" xmlns:r="http://schemas.openxmlformats.org/officeDocument/2006/relationships" xmlns:p="http://schemas.openxmlformats.org/presentationml/2006/main">
+  <p:cSld>
+    <p:spTree>
+      <p:nvGrpSpPr>
+        <p:cNvPr id="1" name=""/>
+        <p:cNvGrpSpPr/>
+        <p:nvPr/>
+      </p:nvGrpSpPr>
+      <p:grpSpPr>
+        <a:xfrm>
+          <a:off x="0" y="0"/>
+          <a:ext cx="0" cy="0"/>
+          <a:chOff x="0" y="0"/>
+          <a:chExt cx="0" cy="0"/>
+        </a:xfrm>
+      </p:grpSpPr>
+      <p:sp>
+        <p:nvSpPr>
+          <p:cNvPr id="13313" name="Rectangle 7"/>
+          <p:cNvSpPr>
+            <a:spLocks noGrp="1" noChangeArrowheads="1"/>
+          </p:cNvSpPr>
+          <p:nvPr>
+            <p:ph type="sldNum" sz="quarter" idx="5"/>
+          </p:nvPr>
+        </p:nvSpPr>
+        <p:spPr bwMode="auto">
+          <a:noFill/>
+          <a:extLst>
+            <a:ext uri="{909E8E84-426E-40dd-AFC4-6F175D3DCCD1}">
+              <a14:hiddenFill xmlns:a14="http://schemas.microsoft.com/office/drawing/2010/main">
+                <a:solidFill>
+                  <a:srgbClr val="FFFFFF"/>
+                </a:solidFill>
+              </a14:hiddenFill>
+            </a:ext>
+            <a:ext uri="{91240B29-F687-4f45-9708-019B960494DF}">
+              <a14:hiddenLine xmlns:a14="http://schemas.microsoft.com/office/drawing/2010/main" w="9525">
+                <a:solidFill>
+                  <a:srgbClr val="000000"/>
+                </a:solidFill>
+                <a:miter lim="800000"/>
+                <a:headEnd/>
+                <a:tailEnd/>
+              </a14:hiddenLine>
+            </a:ext>
+          </a:extLst>
+        </p:spPr>
+        <p:txBody>
+          <a:bodyPr/>
+          <a:lstStyle>
+            <a:lvl1pPr eaLnBrk="0" hangingPunct="0">
+              <a:defRPr sz="2400">
+                <a:solidFill>
+                  <a:schemeClr val="tx1"/>
+                </a:solidFill>
+                <a:latin typeface="Arial" charset="0"/>
+                <a:ea typeface="ＭＳ Ｐゴシック" charset="0"/>
+                <a:cs typeface="ＭＳ Ｐゴシック" charset="0"/>
+              </a:defRPr>
+            </a:lvl1pPr>
+            <a:lvl2pPr marL="742950" indent="-285750" eaLnBrk="0" hangingPunct="0">
+              <a:defRPr sz="2400">
+                <a:solidFill>
+                  <a:schemeClr val="tx1"/>
+                </a:solidFill>
+                <a:latin typeface="Arial" charset="0"/>
+                <a:ea typeface="ＭＳ Ｐゴシック" charset="0"/>
+              </a:defRPr>
+            </a:lvl2pPr>
+            <a:lvl3pPr marL="1143000" indent="-228600" eaLnBrk="0" hangingPunct="0">
+              <a:defRPr sz="2400">
+                <a:solidFill>
+                  <a:schemeClr val="tx1"/>
+                </a:solidFill>
+                <a:latin typeface="Arial" charset="0"/>
+                <a:ea typeface="ＭＳ Ｐゴシック" charset="0"/>
+              </a:defRPr>
+            </a:lvl3pPr>
+            <a:lvl4pPr marL="1600200" indent="-228600" eaLnBrk="0" hangingPunct="0">
+              <a:defRPr sz="2400">
+                <a:solidFill>
+                  <a:schemeClr val="tx1"/>
+                </a:solidFill>
+                <a:latin typeface="Arial" charset="0"/>
+                <a:ea typeface="ＭＳ Ｐゴシック" charset="0"/>
+              </a:defRPr>
+            </a:lvl4pPr>
+            <a:lvl5pPr marL="2057400" indent="-228600" eaLnBrk="0" hangingPunct="0">
+              <a:defRPr sz="2400">
+                <a:solidFill>
+                  <a:schemeClr val="tx1"/>
+                </a:solidFill>
+                <a:latin typeface="Arial" charset="0"/>
+                <a:ea typeface="ＭＳ Ｐゴシック" charset="0"/>
+              </a:defRPr>
+            </a:lvl5pPr>
+            <a:lvl6pPr marL="2514600" indent="-228600" eaLnBrk="0" fontAlgn="base" hangingPunct="0">
+              <a:spcBef>
+                <a:spcPct val="0"/>
+              </a:spcBef>
+              <a:spcAft>
+                <a:spcPct val="0"/>
+              </a:spcAft>
+              <a:defRPr sz="2400">
+                <a:solidFill>
+                  <a:schemeClr val="tx1"/>
+                </a:solidFill>
+                <a:latin typeface="Arial" charset="0"/>
+                <a:ea typeface="ＭＳ Ｐゴシック" charset="0"/>
+              </a:defRPr>
+            </a:lvl6pPr>
+            <a:lvl7pPr marL="2971800" indent="-228600" eaLnBrk="0" fontAlgn="base" hangingPunct="0">
+              <a:spcBef>
+                <a:spcPct val="0"/>
+              </a:spcBef>
+              <a:spcAft>
+                <a:spcPct val="0"/>
+              </a:spcAft>
+              <a:defRPr sz="2400">
+                <a:solidFill>
+                  <a:schemeClr val="tx1"/>
+                </a:solidFill>
+                <a:latin typeface="Arial" charset="0"/>
+                <a:ea typeface="ＭＳ Ｐゴシック" charset="0"/>
+              </a:defRPr>
+            </a:lvl7pPr>
+            <a:lvl8pPr marL="3429000" indent="-228600" eaLnBrk="0" fontAlgn="base" hangingPunct="0">
+              <a:spcBef>
+                <a:spcPct val="0"/>
+              </a:spcBef>
+              <a:spcAft>
+                <a:spcPct val="0"/>
+              </a:spcAft>
+              <a:defRPr sz="2400">
+                <a:solidFill>
+                  <a:schemeClr val="tx1"/>
+                </a:solidFill>
+                <a:latin typeface="Arial" charset="0"/>
+                <a:ea typeface="ＭＳ Ｐゴシック" charset="0"/>
+              </a:defRPr>
+            </a:lvl8pPr>
+            <a:lvl9pPr marL="3886200" indent="-228600" eaLnBrk="0" fontAlgn="base" hangingPunct="0">
+              <a:spcBef>
+                <a:spcPct val="0"/>
+              </a:spcBef>
+              <a:spcAft>
+                <a:spcPct val="0"/>
+              </a:spcAft>
+              <a:defRPr sz="2400">
+                <a:solidFill>
+                  <a:schemeClr val="tx1"/>
+                </a:solidFill>
+                <a:latin typeface="Arial" charset="0"/>
+                <a:ea typeface="ＭＳ Ｐゴシック" charset="0"/>
+              </a:defRPr>
+            </a:lvl9pPr>
+          </a:lstStyle>
+          <a:p>
+            <a:pPr eaLnBrk="1" hangingPunct="1"/>
+            <a:fld id="{D924F94F-8486-FD4A-B1DC-4D561309089E}" type="slidenum">
+              <a:rPr lang="en-US" sz="1300">
+                <a:latin typeface="Calibri" charset="0"/>
+              </a:rPr>
+              <a:pPr eaLnBrk="1" hangingPunct="1"/>
+              <a:t>3</a:t>
+            </a:fld>
+            <a:endParaRPr lang="en-US" sz="1300">
+              <a:latin typeface="Calibri" charset="0"/>
+            </a:endParaRPr>
+          </a:p>
+        </p:txBody>
+      </p:sp>
+      <p:sp>
+        <p:nvSpPr>
+          <p:cNvPr id="13314" name="Rectangle 2"/>
+          <p:cNvSpPr>
+            <a:spLocks noGrp="1" noRot="1" noChangeAspect="1" noChangeArrowheads="1" noTextEdit="1"/>
+          </p:cNvSpPr>
+          <p:nvPr>
+            <p:ph type="sldImg"/>
+          </p:nvPr>
+        </p:nvSpPr>
+        <p:spPr bwMode="auto">
+          <a:solidFill>
+            <a:srgbClr val="FFFFFF"/>
+          </a:solidFill>
+          <a:ln>
+            <a:solidFill>
+              <a:srgbClr val="000000"/>
+            </a:solidFill>
+            <a:miter lim="800000"/>
+            <a:headEnd/>
+            <a:tailEnd/>
+          </a:ln>
+          <a:extLst>
+            <a:ext uri="{FAA26D3D-D897-4be2-8F04-BA451C77F1D7}">
+              <ma14:placeholderFlag xmlns:ma14="http://schemas.microsoft.com/office/mac/drawingml/2011/main" val="1"/>
+            </a:ext>
+          </a:extLst>
+        </p:spPr>
+      </p:sp>
+      <p:sp>
+        <p:nvSpPr>
+          <p:cNvPr id="13315" name="Rectangle 3"/>
+          <p:cNvSpPr>
+            <a:spLocks noGrp="1" noChangeArrowheads="1"/>
+          </p:cNvSpPr>
+          <p:nvPr>
+            <p:ph type="body" idx="1"/>
+          </p:nvPr>
+        </p:nvSpPr>
+        <p:spPr bwMode="auto">
+          <a:solidFill>
+            <a:srgbClr val="FFFFFF"/>
+          </a:solidFill>
+          <a:ln>
+            <a:solidFill>
+              <a:srgbClr val="000000"/>
+            </a:solidFill>
+            <a:miter lim="800000"/>
+            <a:headEnd/>
+            <a:tailEnd/>
+          </a:ln>
+          <a:extLst>
+            <a:ext uri="{FAA26D3D-D897-4be2-8F04-BA451C77F1D7}">
+              <ma14:placeholderFlag xmlns:ma14="http://schemas.microsoft.com/office/mac/drawingml/2011/main" val="1"/>
+            </a:ext>
+          </a:extLst>
+        </p:spPr>
+        <p:txBody>
+          <a:bodyPr wrap="square" numCol="1" anchor="t" anchorCtr="0" compatLnSpc="1">
+            <a:prstTxWarp prst="textNoShape">
+              <a:avLst/>
+            </a:prstTxWarp>
+          </a:bodyPr>
+          <a:lstStyle/>
+          <a:p>
+            <a:pPr eaLnBrk="1" hangingPunct="1"/>
+            <a:endParaRPr lang="en-US">
+              <a:latin typeface="Calibri" charset="0"/>
+              <a:ea typeface="ＭＳ Ｐゴシック" charset="0"/>
+              <a:cs typeface="ＭＳ Ｐゴシック" charset="0"/>
+            </a:endParaRPr>
+          </a:p>
+        </p:txBody>
+      </p:sp>
+    </p:spTree>
+  </p:cSld>
+  <p:clrMapOvr>
+    <a:masterClrMapping/>
+  </p:clrMapOvr>
+</p:notes>
+</file>
+
+<file path=ppt/notesSlides/notesSlide2.xml><?xml version="1.0" encoding="utf-8"?>
+<p:notes xmlns:a="http://schemas.openxmlformats.org/drawingml/2006/main" xmlns:r="http://schemas.openxmlformats.org/officeDocument/2006/relationships" xmlns:p="http://schemas.openxmlformats.org/presentationml/2006/main">
+  <p:cSld>
+    <p:spTree>
+      <p:nvGrpSpPr>
+        <p:cNvPr id="1" name=""/>
+        <p:cNvGrpSpPr/>
+        <p:nvPr/>
+      </p:nvGrpSpPr>
+      <p:grpSpPr>
+        <a:xfrm>
+          <a:off x="0" y="0"/>
+          <a:ext cx="0" cy="0"/>
+          <a:chOff x="0" y="0"/>
+          <a:chExt cx="0" cy="0"/>
+        </a:xfrm>
+      </p:grpSpPr>
+      <p:sp>
+        <p:nvSpPr>
+          <p:cNvPr id="16385" name="Rectangle 7"/>
+          <p:cNvSpPr>
+            <a:spLocks noGrp="1" noChangeArrowheads="1"/>
+          </p:cNvSpPr>
+          <p:nvPr>
+            <p:ph type="sldNum" sz="quarter" idx="5"/>
+          </p:nvPr>
+        </p:nvSpPr>
+        <p:spPr bwMode="auto">
+          <a:noFill/>
+          <a:extLst>
+            <a:ext uri="{909E8E84-426E-40dd-AFC4-6F175D3DCCD1}">
+              <a14:hiddenFill xmlns:a14="http://schemas.microsoft.com/office/drawing/2010/main">
+                <a:solidFill>
+                  <a:srgbClr val="FFFFFF"/>
+                </a:solidFill>
+              </a14:hiddenFill>
+            </a:ext>
+            <a:ext uri="{91240B29-F687-4f45-9708-019B960494DF}">
+              <a14:hiddenLine xmlns:a14="http://schemas.microsoft.com/office/drawing/2010/main" w="9525">
+                <a:solidFill>
+                  <a:srgbClr val="000000"/>
+                </a:solidFill>
+                <a:miter lim="800000"/>
+                <a:headEnd/>
+                <a:tailEnd/>
+              </a14:hiddenLine>
+            </a:ext>
+          </a:extLst>
+        </p:spPr>
+        <p:txBody>
+          <a:bodyPr/>
+          <a:lstStyle>
+            <a:lvl1pPr eaLnBrk="0" hangingPunct="0">
+              <a:defRPr sz="2400">
+                <a:solidFill>
+                  <a:schemeClr val="tx1"/>
+                </a:solidFill>
+                <a:latin typeface="Arial" charset="0"/>
+                <a:ea typeface="ＭＳ Ｐゴシック" charset="0"/>
+                <a:cs typeface="ＭＳ Ｐゴシック" charset="0"/>
+              </a:defRPr>
+            </a:lvl1pPr>
+            <a:lvl2pPr marL="742950" indent="-285750" eaLnBrk="0" hangingPunct="0">
+              <a:defRPr sz="2400">
+                <a:solidFill>
+                  <a:schemeClr val="tx1"/>
+                </a:solidFill>
+                <a:latin typeface="Arial" charset="0"/>
+                <a:ea typeface="ＭＳ Ｐゴシック" charset="0"/>
+              </a:defRPr>
+            </a:lvl2pPr>
+            <a:lvl3pPr marL="1143000" indent="-228600" eaLnBrk="0" hangingPunct="0">
+              <a:defRPr sz="2400">
+                <a:solidFill>
+                  <a:schemeClr val="tx1"/>
+                </a:solidFill>
+                <a:latin typeface="Arial" charset="0"/>
+                <a:ea typeface="ＭＳ Ｐゴシック" charset="0"/>
+              </a:defRPr>
+            </a:lvl3pPr>
+            <a:lvl4pPr marL="1600200" indent="-228600" eaLnBrk="0" hangingPunct="0">
+              <a:defRPr sz="2400">
+                <a:solidFill>
+                  <a:schemeClr val="tx1"/>
+                </a:solidFill>
+                <a:latin typeface="Arial" charset="0"/>
+                <a:ea typeface="ＭＳ Ｐゴシック" charset="0"/>
+              </a:defRPr>
+            </a:lvl4pPr>
+            <a:lvl5pPr marL="2057400" indent="-228600" eaLnBrk="0" hangingPunct="0">
+              <a:defRPr sz="2400">
+                <a:solidFill>
+                  <a:schemeClr val="tx1"/>
+                </a:solidFill>
+                <a:latin typeface="Arial" charset="0"/>
+                <a:ea typeface="ＭＳ Ｐゴシック" charset="0"/>
+              </a:defRPr>
+            </a:lvl5pPr>
+            <a:lvl6pPr marL="2514600" indent="-228600" eaLnBrk="0" fontAlgn="base" hangingPunct="0">
+              <a:spcBef>
+                <a:spcPct val="0"/>
+              </a:spcBef>
+              <a:spcAft>
+                <a:spcPct val="0"/>
+              </a:spcAft>
+              <a:defRPr sz="2400">
+                <a:solidFill>
+                  <a:schemeClr val="tx1"/>
+                </a:solidFill>
+                <a:latin typeface="Arial" charset="0"/>
+                <a:ea typeface="ＭＳ Ｐゴシック" charset="0"/>
+              </a:defRPr>
+            </a:lvl6pPr>
+            <a:lvl7pPr marL="2971800" indent="-228600" eaLnBrk="0" fontAlgn="base" hangingPunct="0">
+              <a:spcBef>
+                <a:spcPct val="0"/>
+              </a:spcBef>
+              <a:spcAft>
+                <a:spcPct val="0"/>
+              </a:spcAft>
+              <a:defRPr sz="2400">
+                <a:solidFill>
+                  <a:schemeClr val="tx1"/>
+                </a:solidFill>
+                <a:latin typeface="Arial" charset="0"/>
+                <a:ea typeface="ＭＳ Ｐゴシック" charset="0"/>
+              </a:defRPr>
+            </a:lvl7pPr>
+            <a:lvl8pPr marL="3429000" indent="-228600" eaLnBrk="0" fontAlgn="base" hangingPunct="0">
+              <a:spcBef>
+                <a:spcPct val="0"/>
+              </a:spcBef>
+              <a:spcAft>
+                <a:spcPct val="0"/>
+              </a:spcAft>
+              <a:defRPr sz="2400">
+                <a:solidFill>
+                  <a:schemeClr val="tx1"/>
+                </a:solidFill>
+                <a:latin typeface="Arial" charset="0"/>
+                <a:ea typeface="ＭＳ Ｐゴシック" charset="0"/>
+              </a:defRPr>
+            </a:lvl8pPr>
+            <a:lvl9pPr marL="3886200" indent="-228600" eaLnBrk="0" fontAlgn="base" hangingPunct="0">
+              <a:spcBef>
+                <a:spcPct val="0"/>
+              </a:spcBef>
+              <a:spcAft>
+                <a:spcPct val="0"/>
+              </a:spcAft>
+              <a:defRPr sz="2400">
+                <a:solidFill>
+                  <a:schemeClr val="tx1"/>
+                </a:solidFill>
+                <a:latin typeface="Arial" charset="0"/>
+                <a:ea typeface="ＭＳ Ｐゴシック" charset="0"/>
+              </a:defRPr>
+            </a:lvl9pPr>
+          </a:lstStyle>
+          <a:p>
+            <a:pPr eaLnBrk="1" hangingPunct="1"/>
+            <a:fld id="{1F39B608-01F2-F045-96A3-C8EFC3ACD74C}" type="slidenum">
+              <a:rPr lang="en-US" sz="1300">
+                <a:latin typeface="Calibri" charset="0"/>
+              </a:rPr>
+              <a:pPr eaLnBrk="1" hangingPunct="1"/>
+              <a:t>4</a:t>
+            </a:fld>
+            <a:endParaRPr lang="en-US" sz="1300">
+              <a:latin typeface="Calibri" charset="0"/>
+            </a:endParaRPr>
+          </a:p>
+        </p:txBody>
+      </p:sp>
+      <p:sp>
+        <p:nvSpPr>
+          <p:cNvPr id="16386" name="Rectangle 2"/>
+          <p:cNvSpPr>
+            <a:spLocks noGrp="1" noRot="1" noChangeAspect="1" noChangeArrowheads="1" noTextEdit="1"/>
+          </p:cNvSpPr>
+          <p:nvPr>
+            <p:ph type="sldImg"/>
+          </p:nvPr>
+        </p:nvSpPr>
+        <p:spPr bwMode="auto">
+          <a:solidFill>
+            <a:srgbClr val="FFFFFF"/>
+          </a:solidFill>
+          <a:ln>
+            <a:solidFill>
+              <a:srgbClr val="000000"/>
+            </a:solidFill>
+            <a:miter lim="800000"/>
+            <a:headEnd/>
+            <a:tailEnd/>
+          </a:ln>
+          <a:extLst>
+            <a:ext uri="{FAA26D3D-D897-4be2-8F04-BA451C77F1D7}">
+              <ma14:placeholderFlag xmlns:ma14="http://schemas.microsoft.com/office/mac/drawingml/2011/main" val="1"/>
+            </a:ext>
+          </a:extLst>
+        </p:spPr>
+      </p:sp>
+      <p:sp>
+        <p:nvSpPr>
+          <p:cNvPr id="16387" name="Rectangle 3"/>
+          <p:cNvSpPr>
+            <a:spLocks noGrp="1" noChangeArrowheads="1"/>
+          </p:cNvSpPr>
+          <p:nvPr>
+            <p:ph type="body" idx="1"/>
+          </p:nvPr>
+        </p:nvSpPr>
+        <p:spPr bwMode="auto">
+          <a:solidFill>
+            <a:srgbClr val="FFFFFF"/>
+          </a:solidFill>
+          <a:ln>
+            <a:solidFill>
+              <a:srgbClr val="000000"/>
+            </a:solidFill>
+            <a:miter lim="800000"/>
+            <a:headEnd/>
+            <a:tailEnd/>
+          </a:ln>
+          <a:extLst>
+            <a:ext uri="{FAA26D3D-D897-4be2-8F04-BA451C77F1D7}">
+              <ma14:placeholderFlag xmlns:ma14="http://schemas.microsoft.com/office/mac/drawingml/2011/main" val="1"/>
+            </a:ext>
+          </a:extLst>
+        </p:spPr>
+        <p:txBody>
+          <a:bodyPr wrap="square" numCol="1" anchor="t" anchorCtr="0" compatLnSpc="1">
+            <a:prstTxWarp prst="textNoShape">
+              <a:avLst/>
+            </a:prstTxWarp>
+          </a:bodyPr>
+          <a:lstStyle/>
+          <a:p>
+            <a:pPr eaLnBrk="1" hangingPunct="1"/>
+            <a:endParaRPr lang="en-US">
+              <a:latin typeface="Calibri" charset="0"/>
+              <a:ea typeface="ＭＳ Ｐゴシック" charset="0"/>
+              <a:cs typeface="ＭＳ Ｐゴシック" charset="0"/>
+            </a:endParaRPr>
+          </a:p>
+        </p:txBody>
+      </p:sp>
+    </p:spTree>
+  </p:cSld>
+  <p:clrMapOvr>
+    <a:masterClrMapping/>
+  </p:clrMapOvr>
+</p:notes>
+</file>
+
+<file path=ppt/notesSlides/notesSlide3.xml><?xml version="1.0" encoding="utf-8"?>
+<p:notes xmlns:a="http://schemas.openxmlformats.org/drawingml/2006/main" xmlns:r="http://schemas.openxmlformats.org/officeDocument/2006/relationships" xmlns:p="http://schemas.openxmlformats.org/presentationml/2006/main">
+  <p:cSld>
+    <p:spTree>
+      <p:nvGrpSpPr>
+        <p:cNvPr id="1" name=""/>
+        <p:cNvGrpSpPr/>
+        <p:nvPr/>
+      </p:nvGrpSpPr>
+      <p:grpSpPr>
+        <a:xfrm>
+          <a:off x="0" y="0"/>
+          <a:ext cx="0" cy="0"/>
+          <a:chOff x="0" y="0"/>
+          <a:chExt cx="0" cy="0"/>
+        </a:xfrm>
+      </p:grpSpPr>
+      <p:sp>
+        <p:nvSpPr>
+          <p:cNvPr id="16385" name="Rectangle 7"/>
+          <p:cNvSpPr>
+            <a:spLocks noGrp="1" noChangeArrowheads="1"/>
+          </p:cNvSpPr>
+          <p:nvPr>
+            <p:ph type="sldNum" sz="quarter" idx="5"/>
+          </p:nvPr>
+        </p:nvSpPr>
+        <p:spPr bwMode="auto">
+          <a:noFill/>
+          <a:extLst>
+            <a:ext uri="{909E8E84-426E-40dd-AFC4-6F175D3DCCD1}">
+              <a14:hiddenFill xmlns:a14="http://schemas.microsoft.com/office/drawing/2010/main">
+                <a:solidFill>
+                  <a:srgbClr val="FFFFFF"/>
+                </a:solidFill>
+              </a14:hiddenFill>
+            </a:ext>
+            <a:ext uri="{91240B29-F687-4f45-9708-019B960494DF}">
+              <a14:hiddenLine xmlns:a14="http://schemas.microsoft.com/office/drawing/2010/main" w="9525">
+                <a:solidFill>
+                  <a:srgbClr val="000000"/>
+                </a:solidFill>
+                <a:miter lim="800000"/>
+                <a:headEnd/>
+                <a:tailEnd/>
+              </a14:hiddenLine>
+            </a:ext>
+          </a:extLst>
+        </p:spPr>
+        <p:txBody>
+          <a:bodyPr/>
+          <a:lstStyle>
+            <a:lvl1pPr eaLnBrk="0" hangingPunct="0">
+              <a:defRPr sz="2400">
+                <a:solidFill>
+                  <a:schemeClr val="tx1"/>
+                </a:solidFill>
+                <a:latin typeface="Arial" charset="0"/>
+                <a:ea typeface="ＭＳ Ｐゴシック" charset="0"/>
+                <a:cs typeface="ＭＳ Ｐゴシック" charset="0"/>
+              </a:defRPr>
+            </a:lvl1pPr>
+            <a:lvl2pPr marL="742950" indent="-285750" eaLnBrk="0" hangingPunct="0">
+              <a:defRPr sz="2400">
+                <a:solidFill>
+                  <a:schemeClr val="tx1"/>
+                </a:solidFill>
+                <a:latin typeface="Arial" charset="0"/>
+                <a:ea typeface="ＭＳ Ｐゴシック" charset="0"/>
+              </a:defRPr>
+            </a:lvl2pPr>
+            <a:lvl3pPr marL="1143000" indent="-228600" eaLnBrk="0" hangingPunct="0">
+              <a:defRPr sz="2400">
+                <a:solidFill>
+                  <a:schemeClr val="tx1"/>
+                </a:solidFill>
+                <a:latin typeface="Arial" charset="0"/>
+                <a:ea typeface="ＭＳ Ｐゴシック" charset="0"/>
+              </a:defRPr>
+            </a:lvl3pPr>
+            <a:lvl4pPr marL="1600200" indent="-228600" eaLnBrk="0" hangingPunct="0">
+              <a:defRPr sz="2400">
+                <a:solidFill>
+                  <a:schemeClr val="tx1"/>
+                </a:solidFill>
+                <a:latin typeface="Arial" charset="0"/>
+                <a:ea typeface="ＭＳ Ｐゴシック" charset="0"/>
+              </a:defRPr>
+            </a:lvl4pPr>
+            <a:lvl5pPr marL="2057400" indent="-228600" eaLnBrk="0" hangingPunct="0">
+              <a:defRPr sz="2400">
+                <a:solidFill>
+                  <a:schemeClr val="tx1"/>
+                </a:solidFill>
+                <a:latin typeface="Arial" charset="0"/>
+                <a:ea typeface="ＭＳ Ｐゴシック" charset="0"/>
+              </a:defRPr>
+            </a:lvl5pPr>
+            <a:lvl6pPr marL="2514600" indent="-228600" eaLnBrk="0" fontAlgn="base" hangingPunct="0">
+              <a:spcBef>
+                <a:spcPct val="0"/>
+              </a:spcBef>
+              <a:spcAft>
+                <a:spcPct val="0"/>
+              </a:spcAft>
+              <a:defRPr sz="2400">
+                <a:solidFill>
+                  <a:schemeClr val="tx1"/>
+                </a:solidFill>
+                <a:latin typeface="Arial" charset="0"/>
+                <a:ea typeface="ＭＳ Ｐゴシック" charset="0"/>
+              </a:defRPr>
+            </a:lvl6pPr>
+            <a:lvl7pPr marL="2971800" indent="-228600" eaLnBrk="0" fontAlgn="base" hangingPunct="0">
+              <a:spcBef>
+                <a:spcPct val="0"/>
+              </a:spcBef>
+              <a:spcAft>
+                <a:spcPct val="0"/>
+              </a:spcAft>
+              <a:defRPr sz="2400">
+                <a:solidFill>
+                  <a:schemeClr val="tx1"/>
+                </a:solidFill>
+                <a:latin typeface="Arial" charset="0"/>
+                <a:ea typeface="ＭＳ Ｐゴシック" charset="0"/>
+              </a:defRPr>
+            </a:lvl7pPr>
+            <a:lvl8pPr marL="3429000" indent="-228600" eaLnBrk="0" fontAlgn="base" hangingPunct="0">
+              <a:spcBef>
+                <a:spcPct val="0"/>
+              </a:spcBef>
+              <a:spcAft>
+                <a:spcPct val="0"/>
+              </a:spcAft>
+              <a:defRPr sz="2400">
+                <a:solidFill>
+                  <a:schemeClr val="tx1"/>
+                </a:solidFill>
+                <a:latin typeface="Arial" charset="0"/>
+                <a:ea typeface="ＭＳ Ｐゴシック" charset="0"/>
+              </a:defRPr>
+            </a:lvl8pPr>
+            <a:lvl9pPr marL="3886200" indent="-228600" eaLnBrk="0" fontAlgn="base" hangingPunct="0">
+              <a:spcBef>
+                <a:spcPct val="0"/>
+              </a:spcBef>
+              <a:spcAft>
+                <a:spcPct val="0"/>
+              </a:spcAft>
+              <a:defRPr sz="2400">
+                <a:solidFill>
+                  <a:schemeClr val="tx1"/>
+                </a:solidFill>
+                <a:latin typeface="Arial" charset="0"/>
+                <a:ea typeface="ＭＳ Ｐゴシック" charset="0"/>
+              </a:defRPr>
+            </a:lvl9pPr>
+          </a:lstStyle>
+          <a:p>
+            <a:pPr eaLnBrk="1" hangingPunct="1"/>
+            <a:fld id="{1F39B608-01F2-F045-96A3-C8EFC3ACD74C}" type="slidenum">
+              <a:rPr lang="en-US" sz="1300">
+                <a:latin typeface="Calibri" charset="0"/>
+              </a:rPr>
+              <a:pPr eaLnBrk="1" hangingPunct="1"/>
+              <a:t>5</a:t>
+            </a:fld>
+            <a:endParaRPr lang="en-US" sz="1300">
+              <a:latin typeface="Calibri" charset="0"/>
+            </a:endParaRPr>
+          </a:p>
+        </p:txBody>
+      </p:sp>
+      <p:sp>
+        <p:nvSpPr>
+          <p:cNvPr id="16386" name="Rectangle 2"/>
+          <p:cNvSpPr>
+            <a:spLocks noGrp="1" noRot="1" noChangeAspect="1" noChangeArrowheads="1" noTextEdit="1"/>
+          </p:cNvSpPr>
+          <p:nvPr>
+            <p:ph type="sldImg"/>
+          </p:nvPr>
+        </p:nvSpPr>
+        <p:spPr bwMode="auto">
+          <a:solidFill>
+            <a:srgbClr val="FFFFFF"/>
+          </a:solidFill>
+          <a:ln>
+            <a:solidFill>
+              <a:srgbClr val="000000"/>
+            </a:solidFill>
+            <a:miter lim="800000"/>
+            <a:headEnd/>
+            <a:tailEnd/>
+          </a:ln>
+          <a:extLst>
+            <a:ext uri="{FAA26D3D-D897-4be2-8F04-BA451C77F1D7}">
+              <ma14:placeholderFlag xmlns:ma14="http://schemas.microsoft.com/office/mac/drawingml/2011/main" val="1"/>
+            </a:ext>
+          </a:extLst>
+        </p:spPr>
+      </p:sp>
+      <p:sp>
+        <p:nvSpPr>
+          <p:cNvPr id="16387" name="Rectangle 3"/>
+          <p:cNvSpPr>
+            <a:spLocks noGrp="1" noChangeArrowheads="1"/>
+          </p:cNvSpPr>
+          <p:nvPr>
+            <p:ph type="body" idx="1"/>
+          </p:nvPr>
+        </p:nvSpPr>
+        <p:spPr bwMode="auto">
+          <a:solidFill>
+            <a:srgbClr val="FFFFFF"/>
+          </a:solidFill>
+          <a:ln>
+            <a:solidFill>
+              <a:srgbClr val="000000"/>
+            </a:solidFill>
+            <a:miter lim="800000"/>
+            <a:headEnd/>
+            <a:tailEnd/>
+          </a:ln>
+          <a:extLst>
+            <a:ext uri="{FAA26D3D-D897-4be2-8F04-BA451C77F1D7}">
+              <ma14:placeholderFlag xmlns:ma14="http://schemas.microsoft.com/office/mac/drawingml/2011/main" val="1"/>
+            </a:ext>
+          </a:extLst>
+        </p:spPr>
+        <p:txBody>
+          <a:bodyPr wrap="square" numCol="1" anchor="t" anchorCtr="0" compatLnSpc="1">
+            <a:prstTxWarp prst="textNoShape">
+              <a:avLst/>
+            </a:prstTxWarp>
+          </a:bodyPr>
+          <a:lstStyle/>
+          <a:p>
+            <a:pPr eaLnBrk="1" hangingPunct="1"/>
+            <a:endParaRPr lang="en-US">
+              <a:latin typeface="Calibri" charset="0"/>
+              <a:ea typeface="ＭＳ Ｐゴシック" charset="0"/>
+              <a:cs typeface="ＭＳ Ｐゴシック" charset="0"/>
+            </a:endParaRPr>
+          </a:p>
+        </p:txBody>
+      </p:sp>
+    </p:spTree>
+  </p:cSld>
+  <p:clrMapOvr>
+    <a:masterClrMapping/>
+  </p:clrMapOvr>
+</p:notes>
+</file>
+
+<file path=ppt/notesSlides/notesSlide4.xml><?xml version="1.0" encoding="utf-8"?>
+<p:notes xmlns:a="http://schemas.openxmlformats.org/drawingml/2006/main" xmlns:r="http://schemas.openxmlformats.org/officeDocument/2006/relationships" xmlns:p="http://schemas.openxmlformats.org/presentationml/2006/main">
+  <p:cSld>
+    <p:spTree>
+      <p:nvGrpSpPr>
+        <p:cNvPr id="1" name=""/>
+        <p:cNvGrpSpPr/>
+        <p:nvPr/>
+      </p:nvGrpSpPr>
+      <p:grpSpPr>
+        <a:xfrm>
+          <a:off x="0" y="0"/>
+          <a:ext cx="0" cy="0"/>
+          <a:chOff x="0" y="0"/>
+          <a:chExt cx="0" cy="0"/>
+        </a:xfrm>
+      </p:grpSpPr>
+      <p:sp>
+        <p:nvSpPr>
+          <p:cNvPr id="20481" name="Rectangle 7"/>
+          <p:cNvSpPr>
+            <a:spLocks noGrp="1" noChangeArrowheads="1"/>
+          </p:cNvSpPr>
+          <p:nvPr>
+            <p:ph type="sldNum" sz="quarter" idx="5"/>
+          </p:nvPr>
+        </p:nvSpPr>
+        <p:spPr bwMode="auto">
+          <a:noFill/>
+          <a:extLst>
+            <a:ext uri="{909E8E84-426E-40dd-AFC4-6F175D3DCCD1}">
+              <a14:hiddenFill xmlns:a14="http://schemas.microsoft.com/office/drawing/2010/main">
+                <a:solidFill>
+                  <a:srgbClr val="FFFFFF"/>
+                </a:solidFill>
+              </a14:hiddenFill>
+            </a:ext>
+            <a:ext uri="{91240B29-F687-4f45-9708-019B960494DF}">
+              <a14:hiddenLine xmlns:a14="http://schemas.microsoft.com/office/drawing/2010/main" w="9525">
+                <a:solidFill>
+                  <a:srgbClr val="000000"/>
+                </a:solidFill>
+                <a:miter lim="800000"/>
+                <a:headEnd/>
+                <a:tailEnd/>
+              </a14:hiddenLine>
+            </a:ext>
+          </a:extLst>
+        </p:spPr>
+        <p:txBody>
+          <a:bodyPr/>
+          <a:lstStyle>
+            <a:lvl1pPr eaLnBrk="0" hangingPunct="0">
+              <a:defRPr sz="2400">
+                <a:solidFill>
+                  <a:schemeClr val="tx1"/>
+                </a:solidFill>
+                <a:latin typeface="Arial" charset="0"/>
+                <a:ea typeface="ＭＳ Ｐゴシック" charset="0"/>
+                <a:cs typeface="ＭＳ Ｐゴシック" charset="0"/>
+              </a:defRPr>
+            </a:lvl1pPr>
+            <a:lvl2pPr marL="742950" indent="-285750" eaLnBrk="0" hangingPunct="0">
+              <a:defRPr sz="2400">
+                <a:solidFill>
+                  <a:schemeClr val="tx1"/>
+                </a:solidFill>
+                <a:latin typeface="Arial" charset="0"/>
+                <a:ea typeface="ＭＳ Ｐゴシック" charset="0"/>
+              </a:defRPr>
+            </a:lvl2pPr>
+            <a:lvl3pPr marL="1143000" indent="-228600" eaLnBrk="0" hangingPunct="0">
+              <a:defRPr sz="2400">
+                <a:solidFill>
+                  <a:schemeClr val="tx1"/>
+                </a:solidFill>
+                <a:latin typeface="Arial" charset="0"/>
+                <a:ea typeface="ＭＳ Ｐゴシック" charset="0"/>
+              </a:defRPr>
+            </a:lvl3pPr>
+            <a:lvl4pPr marL="1600200" indent="-228600" eaLnBrk="0" hangingPunct="0">
+              <a:defRPr sz="2400">
+                <a:solidFill>
+                  <a:schemeClr val="tx1"/>
+                </a:solidFill>
+                <a:latin typeface="Arial" charset="0"/>
+                <a:ea typeface="ＭＳ Ｐゴシック" charset="0"/>
+              </a:defRPr>
+            </a:lvl4pPr>
+            <a:lvl5pPr marL="2057400" indent="-228600" eaLnBrk="0" hangingPunct="0">
+              <a:defRPr sz="2400">
+                <a:solidFill>
+                  <a:schemeClr val="tx1"/>
+                </a:solidFill>
+                <a:latin typeface="Arial" charset="0"/>
+                <a:ea typeface="ＭＳ Ｐゴシック" charset="0"/>
+              </a:defRPr>
+            </a:lvl5pPr>
+            <a:lvl6pPr marL="2514600" indent="-228600" eaLnBrk="0" fontAlgn="base" hangingPunct="0">
+              <a:spcBef>
+                <a:spcPct val="0"/>
+              </a:spcBef>
+              <a:spcAft>
+                <a:spcPct val="0"/>
+              </a:spcAft>
+              <a:defRPr sz="2400">
+                <a:solidFill>
+                  <a:schemeClr val="tx1"/>
+                </a:solidFill>
+                <a:latin typeface="Arial" charset="0"/>
+                <a:ea typeface="ＭＳ Ｐゴシック" charset="0"/>
+              </a:defRPr>
+            </a:lvl6pPr>
+            <a:lvl7pPr marL="2971800" indent="-228600" eaLnBrk="0" fontAlgn="base" hangingPunct="0">
+              <a:spcBef>
+                <a:spcPct val="0"/>
+              </a:spcBef>
+              <a:spcAft>
+                <a:spcPct val="0"/>
+              </a:spcAft>
+              <a:defRPr sz="2400">
+                <a:solidFill>
+                  <a:schemeClr val="tx1"/>
+                </a:solidFill>
+                <a:latin typeface="Arial" charset="0"/>
+                <a:ea typeface="ＭＳ Ｐゴシック" charset="0"/>
+              </a:defRPr>
+            </a:lvl7pPr>
+            <a:lvl8pPr marL="3429000" indent="-228600" eaLnBrk="0" fontAlgn="base" hangingPunct="0">
+              <a:spcBef>
+                <a:spcPct val="0"/>
+              </a:spcBef>
+              <a:spcAft>
+                <a:spcPct val="0"/>
+              </a:spcAft>
+              <a:defRPr sz="2400">
+                <a:solidFill>
+                  <a:schemeClr val="tx1"/>
+                </a:solidFill>
+                <a:latin typeface="Arial" charset="0"/>
+                <a:ea typeface="ＭＳ Ｐゴシック" charset="0"/>
+              </a:defRPr>
+            </a:lvl8pPr>
+            <a:lvl9pPr marL="3886200" indent="-228600" eaLnBrk="0" fontAlgn="base" hangingPunct="0">
+              <a:spcBef>
+                <a:spcPct val="0"/>
+              </a:spcBef>
+              <a:spcAft>
+                <a:spcPct val="0"/>
+              </a:spcAft>
+              <a:defRPr sz="2400">
+                <a:solidFill>
+                  <a:schemeClr val="tx1"/>
+                </a:solidFill>
+                <a:latin typeface="Arial" charset="0"/>
+                <a:ea typeface="ＭＳ Ｐゴシック" charset="0"/>
+              </a:defRPr>
+            </a:lvl9pPr>
+          </a:lstStyle>
+          <a:p>
+            <a:pPr eaLnBrk="1" hangingPunct="1"/>
+            <a:fld id="{67CE1E5D-C0B3-4744-88D8-D81E5041DD69}" type="slidenum">
+              <a:rPr lang="en-US" sz="1300">
+                <a:latin typeface="Calibri" charset="0"/>
+              </a:rPr>
+              <a:pPr eaLnBrk="1" hangingPunct="1"/>
+              <a:t>6</a:t>
+            </a:fld>
+            <a:endParaRPr lang="en-US" sz="1300">
+              <a:latin typeface="Calibri" charset="0"/>
+            </a:endParaRPr>
+          </a:p>
+        </p:txBody>
+      </p:sp>
+      <p:sp>
+        <p:nvSpPr>
+          <p:cNvPr id="20482" name="Rectangle 2"/>
+          <p:cNvSpPr>
+            <a:spLocks noGrp="1" noRot="1" noChangeAspect="1" noChangeArrowheads="1" noTextEdit="1"/>
+          </p:cNvSpPr>
+          <p:nvPr>
+            <p:ph type="sldImg"/>
+          </p:nvPr>
+        </p:nvSpPr>
+        <p:spPr bwMode="auto">
+          <a:solidFill>
+            <a:srgbClr val="FFFFFF"/>
+          </a:solidFill>
+          <a:ln>
+            <a:solidFill>
+              <a:srgbClr val="000000"/>
+            </a:solidFill>
+            <a:miter lim="800000"/>
+            <a:headEnd/>
+            <a:tailEnd/>
+          </a:ln>
+          <a:extLst>
+            <a:ext uri="{FAA26D3D-D897-4be2-8F04-BA451C77F1D7}">
+              <ma14:placeholderFlag xmlns:ma14="http://schemas.microsoft.com/office/mac/drawingml/2011/main" val="1"/>
+            </a:ext>
+          </a:extLst>
+        </p:spPr>
+      </p:sp>
+      <p:sp>
+        <p:nvSpPr>
+          <p:cNvPr id="20483" name="Rectangle 3"/>
+          <p:cNvSpPr>
+            <a:spLocks noGrp="1" noChangeArrowheads="1"/>
+          </p:cNvSpPr>
+          <p:nvPr>
+            <p:ph type="body" idx="1"/>
+          </p:nvPr>
+        </p:nvSpPr>
+        <p:spPr bwMode="auto">
+          <a:solidFill>
+            <a:srgbClr val="FFFFFF"/>
+          </a:solidFill>
+          <a:ln>
+            <a:solidFill>
+              <a:srgbClr val="000000"/>
+            </a:solidFill>
+            <a:miter lim="800000"/>
+            <a:headEnd/>
+            <a:tailEnd/>
+          </a:ln>
+          <a:extLst>
+            <a:ext uri="{FAA26D3D-D897-4be2-8F04-BA451C77F1D7}">
+              <ma14:placeholderFlag xmlns:ma14="http://schemas.microsoft.com/office/mac/drawingml/2011/main" val="1"/>
+            </a:ext>
+          </a:extLst>
+        </p:spPr>
+        <p:txBody>
+          <a:bodyPr wrap="square" numCol="1" anchor="t" anchorCtr="0" compatLnSpc="1">
+            <a:prstTxWarp prst="textNoShape">
+              <a:avLst/>
+            </a:prstTxWarp>
+          </a:bodyPr>
+          <a:lstStyle/>
+          <a:p>
+            <a:pPr eaLnBrk="1" hangingPunct="1"/>
+            <a:endParaRPr lang="en-US">
+              <a:latin typeface="Calibri" charset="0"/>
+              <a:ea typeface="ＭＳ Ｐゴシック" charset="0"/>
+              <a:cs typeface="ＭＳ Ｐゴシック" charset="0"/>
+            </a:endParaRPr>
+          </a:p>
+        </p:txBody>
+      </p:sp>
+    </p:spTree>
+  </p:cSld>
+  <p:clrMapOvr>
+    <a:masterClrMapping/>
+  </p:clrMapOvr>
+</p:notes>
+</file>
+
+<file path=ppt/notesSlides/notesSlide5.xml><?xml version="1.0" encoding="utf-8"?>
+<p:notes xmlns:a="http://schemas.openxmlformats.org/drawingml/2006/main" xmlns:r="http://schemas.openxmlformats.org/officeDocument/2006/relationships" xmlns:p="http://schemas.openxmlformats.org/presentationml/2006/main">
+  <p:cSld>
+    <p:spTree>
+      <p:nvGrpSpPr>
+        <p:cNvPr id="1" name=""/>
+        <p:cNvGrpSpPr/>
+        <p:nvPr/>
+      </p:nvGrpSpPr>
+      <p:grpSpPr>
+        <a:xfrm>
+          <a:off x="0" y="0"/>
+          <a:ext cx="0" cy="0"/>
+          <a:chOff x="0" y="0"/>
+          <a:chExt cx="0" cy="0"/>
+        </a:xfrm>
+      </p:grpSpPr>
+      <p:sp>
+        <p:nvSpPr>
+          <p:cNvPr id="23553" name="Rectangle 7"/>
+          <p:cNvSpPr>
+            <a:spLocks noGrp="1" noChangeArrowheads="1"/>
+          </p:cNvSpPr>
+          <p:nvPr>
+            <p:ph type="sldNum" sz="quarter" idx="5"/>
+          </p:nvPr>
+        </p:nvSpPr>
+        <p:spPr bwMode="auto">
+          <a:noFill/>
+          <a:extLst>
+            <a:ext uri="{909E8E84-426E-40dd-AFC4-6F175D3DCCD1}">
+              <a14:hiddenFill xmlns:a14="http://schemas.microsoft.com/office/drawing/2010/main">
+                <a:solidFill>
+                  <a:srgbClr val="FFFFFF"/>
+                </a:solidFill>
+              </a14:hiddenFill>
+            </a:ext>
+            <a:ext uri="{91240B29-F687-4f45-9708-019B960494DF}">
+              <a14:hiddenLine xmlns:a14="http://schemas.microsoft.com/office/drawing/2010/main" w="9525">
+                <a:solidFill>
+                  <a:srgbClr val="000000"/>
+                </a:solidFill>
+                <a:miter lim="800000"/>
+                <a:headEnd/>
+                <a:tailEnd/>
+              </a14:hiddenLine>
+            </a:ext>
+          </a:extLst>
+        </p:spPr>
+        <p:txBody>
+          <a:bodyPr/>
+          <a:lstStyle>
+            <a:lvl1pPr eaLnBrk="0" hangingPunct="0">
+              <a:defRPr sz="2400">
+                <a:solidFill>
+                  <a:schemeClr val="tx1"/>
+                </a:solidFill>
+                <a:latin typeface="Arial" charset="0"/>
+                <a:ea typeface="ＭＳ Ｐゴシック" charset="0"/>
+                <a:cs typeface="ＭＳ Ｐゴシック" charset="0"/>
+              </a:defRPr>
+            </a:lvl1pPr>
+            <a:lvl2pPr marL="742950" indent="-285750" eaLnBrk="0" hangingPunct="0">
+              <a:defRPr sz="2400">
+                <a:solidFill>
+                  <a:schemeClr val="tx1"/>
+                </a:solidFill>
+                <a:latin typeface="Arial" charset="0"/>
+                <a:ea typeface="ＭＳ Ｐゴシック" charset="0"/>
+              </a:defRPr>
+            </a:lvl2pPr>
+            <a:lvl3pPr marL="1143000" indent="-228600" eaLnBrk="0" hangingPunct="0">
+              <a:defRPr sz="2400">
+                <a:solidFill>
+                  <a:schemeClr val="tx1"/>
+                </a:solidFill>
+                <a:latin typeface="Arial" charset="0"/>
+                <a:ea typeface="ＭＳ Ｐゴシック" charset="0"/>
+              </a:defRPr>
+            </a:lvl3pPr>
+            <a:lvl4pPr marL="1600200" indent="-228600" eaLnBrk="0" hangingPunct="0">
+              <a:defRPr sz="2400">
+                <a:solidFill>
+                  <a:schemeClr val="tx1"/>
+                </a:solidFill>
+                <a:latin typeface="Arial" charset="0"/>
+                <a:ea typeface="ＭＳ Ｐゴシック" charset="0"/>
+              </a:defRPr>
+            </a:lvl4pPr>
+            <a:lvl5pPr marL="2057400" indent="-228600" eaLnBrk="0" hangingPunct="0">
+              <a:defRPr sz="2400">
+                <a:solidFill>
+                  <a:schemeClr val="tx1"/>
+                </a:solidFill>
+                <a:latin typeface="Arial" charset="0"/>
+                <a:ea typeface="ＭＳ Ｐゴシック" charset="0"/>
+              </a:defRPr>
+            </a:lvl5pPr>
+            <a:lvl6pPr marL="2514600" indent="-228600" eaLnBrk="0" fontAlgn="base" hangingPunct="0">
+              <a:spcBef>
+                <a:spcPct val="0"/>
+              </a:spcBef>
+              <a:spcAft>
+                <a:spcPct val="0"/>
+              </a:spcAft>
+              <a:defRPr sz="2400">
+                <a:solidFill>
+                  <a:schemeClr val="tx1"/>
+                </a:solidFill>
+                <a:latin typeface="Arial" charset="0"/>
+                <a:ea typeface="ＭＳ Ｐゴシック" charset="0"/>
+              </a:defRPr>
+            </a:lvl6pPr>
+            <a:lvl7pPr marL="2971800" indent="-228600" eaLnBrk="0" fontAlgn="base" hangingPunct="0">
+              <a:spcBef>
+                <a:spcPct val="0"/>
+              </a:spcBef>
+              <a:spcAft>
+                <a:spcPct val="0"/>
+              </a:spcAft>
+              <a:defRPr sz="2400">
+                <a:solidFill>
+                  <a:schemeClr val="tx1"/>
+                </a:solidFill>
+                <a:latin typeface="Arial" charset="0"/>
+                <a:ea typeface="ＭＳ Ｐゴシック" charset="0"/>
+              </a:defRPr>
+            </a:lvl7pPr>
+            <a:lvl8pPr marL="3429000" indent="-228600" eaLnBrk="0" fontAlgn="base" hangingPunct="0">
+              <a:spcBef>
+                <a:spcPct val="0"/>
+              </a:spcBef>
+              <a:spcAft>
+                <a:spcPct val="0"/>
+              </a:spcAft>
+              <a:defRPr sz="2400">
+                <a:solidFill>
+                  <a:schemeClr val="tx1"/>
+                </a:solidFill>
+                <a:latin typeface="Arial" charset="0"/>
+                <a:ea typeface="ＭＳ Ｐゴシック" charset="0"/>
+              </a:defRPr>
+            </a:lvl8pPr>
+            <a:lvl9pPr marL="3886200" indent="-228600" eaLnBrk="0" fontAlgn="base" hangingPunct="0">
+              <a:spcBef>
+                <a:spcPct val="0"/>
+              </a:spcBef>
+              <a:spcAft>
+                <a:spcPct val="0"/>
+              </a:spcAft>
+              <a:defRPr sz="2400">
+                <a:solidFill>
+                  <a:schemeClr val="tx1"/>
+                </a:solidFill>
+                <a:latin typeface="Arial" charset="0"/>
+                <a:ea typeface="ＭＳ Ｐゴシック" charset="0"/>
+              </a:defRPr>
+            </a:lvl9pPr>
+          </a:lstStyle>
+          <a:p>
+            <a:pPr eaLnBrk="1" hangingPunct="1"/>
+            <a:fld id="{184844F5-9029-0D45-8E07-E6B77CE66171}" type="slidenum">
+              <a:rPr lang="en-US" sz="1300">
+                <a:latin typeface="Calibri" charset="0"/>
+              </a:rPr>
+              <a:pPr eaLnBrk="1" hangingPunct="1"/>
+              <a:t>8</a:t>
+            </a:fld>
+            <a:endParaRPr lang="en-US" sz="1300">
+              <a:latin typeface="Calibri" charset="0"/>
+            </a:endParaRPr>
+          </a:p>
+        </p:txBody>
+      </p:sp>
+      <p:sp>
+        <p:nvSpPr>
+          <p:cNvPr id="23554" name="Rectangle 2"/>
+          <p:cNvSpPr>
+            <a:spLocks noGrp="1" noRot="1" noChangeAspect="1" noChangeArrowheads="1" noTextEdit="1"/>
+          </p:cNvSpPr>
+          <p:nvPr>
+            <p:ph type="sldImg"/>
+          </p:nvPr>
+        </p:nvSpPr>
+        <p:spPr bwMode="auto">
+          <a:solidFill>
+            <a:srgbClr val="FFFFFF"/>
+          </a:solidFill>
+          <a:ln>
+            <a:solidFill>
+              <a:srgbClr val="000000"/>
+            </a:solidFill>
+            <a:miter lim="800000"/>
+            <a:headEnd/>
+            <a:tailEnd/>
+          </a:ln>
+          <a:extLst>
+            <a:ext uri="{FAA26D3D-D897-4be2-8F04-BA451C77F1D7}">
+              <ma14:placeholderFlag xmlns:ma14="http://schemas.microsoft.com/office/mac/drawingml/2011/main" val="1"/>
+            </a:ext>
+          </a:extLst>
+        </p:spPr>
+      </p:sp>
+      <p:sp>
+        <p:nvSpPr>
+          <p:cNvPr id="23555" name="Rectangle 3"/>
+          <p:cNvSpPr>
+            <a:spLocks noGrp="1" noChangeArrowheads="1"/>
+          </p:cNvSpPr>
+          <p:nvPr>
+            <p:ph type="body" idx="1"/>
+          </p:nvPr>
+        </p:nvSpPr>
+        <p:spPr bwMode="auto">
+          <a:solidFill>
+            <a:srgbClr val="FFFFFF"/>
+          </a:solidFill>
+          <a:ln>
+            <a:solidFill>
+              <a:srgbClr val="000000"/>
+            </a:solidFill>
+            <a:miter lim="800000"/>
+            <a:headEnd/>
+            <a:tailEnd/>
+          </a:ln>
+          <a:extLst>
+            <a:ext uri="{FAA26D3D-D897-4be2-8F04-BA451C77F1D7}">
+              <ma14:placeholderFlag xmlns:ma14="http://schemas.microsoft.com/office/mac/drawingml/2011/main" val="1"/>
+            </a:ext>
+          </a:extLst>
+        </p:spPr>
+        <p:txBody>
+          <a:bodyPr wrap="square" numCol="1" anchor="t" anchorCtr="0" compatLnSpc="1">
+            <a:prstTxWarp prst="textNoShape">
+              <a:avLst/>
+            </a:prstTxWarp>
+          </a:bodyPr>
+          <a:lstStyle/>
+          <a:p>
+            <a:pPr eaLnBrk="1" hangingPunct="1"/>
+            <a:endParaRPr lang="en-US">
+              <a:latin typeface="Calibri" charset="0"/>
+              <a:ea typeface="ＭＳ Ｐゴシック" charset="0"/>
+              <a:cs typeface="ＭＳ Ｐゴシック" charset="0"/>
+            </a:endParaRPr>
+          </a:p>
+        </p:txBody>
+      </p:sp>
+    </p:spTree>
+  </p:cSld>
+  <p:clrMapOvr>
+    <a:masterClrMapping/>
+  </p:clrMapOvr>
+</p:notes>
+</file>
+
 <file path=ppt/slideLayouts/slideLayout1.xml><?xml version="1.0" encoding="utf-8"?>
 <p:sldLayout xmlns:a="http://schemas.openxmlformats.org/drawingml/2006/main" xmlns:r="http://schemas.openxmlformats.org/officeDocument/2006/relationships" xmlns:p="http://schemas.openxmlformats.org/presentationml/2006/main" preserve="1" userDrawn="1">
   <p:cSld name="Title">
@@ -906,14 +2193,14 @@
           </a:ln>
           <a:extLst>
             <a:ext uri="{909E8E84-426E-40dd-AFC4-6F175D3DCCD1}">
-              <a14:hiddenFill xmlns:a14="http://schemas.microsoft.com/office/drawing/2010/main" xmlns="">
+              <a14:hiddenFill xmlns:a14="http://schemas.microsoft.com/office/drawing/2010/main">
                 <a:solidFill>
                   <a:srgbClr val="FFFFFF"/>
                 </a:solidFill>
               </a14:hiddenFill>
             </a:ext>
             <a:ext uri="{91240B29-F687-4f45-9708-019B960494DF}">
-              <a14:hiddenLine xmlns:a14="http://schemas.microsoft.com/office/drawing/2010/main" xmlns="" w="9525">
+              <a14:hiddenLine xmlns:a14="http://schemas.microsoft.com/office/drawing/2010/main" w="9525">
                 <a:solidFill>
                   <a:srgbClr val="000000"/>
                 </a:solidFill>
@@ -2936,18 +4223,15 @@
             <a:noFill/>
           </a:ln>
           <a:extLst>
-            <a:ext uri="{FAA26D3D-D897-4be2-8F04-BA451C77F1D7}">
-              <ma14:placeholderFlag xmlns:ma14="http://schemas.microsoft.com/office/mac/drawingml/2011/main" val="1"/>
-            </a:ext>
             <a:ext uri="{909E8E84-426E-40dd-AFC4-6F175D3DCCD1}">
-              <a14:hiddenFill xmlns:a14="http://schemas.microsoft.com/office/drawing/2010/main" xmlns="">
+              <a14:hiddenFill xmlns:a14="http://schemas.microsoft.com/office/drawing/2010/main">
                 <a:solidFill>
                   <a:srgbClr val="FFFFFF"/>
                 </a:solidFill>
               </a14:hiddenFill>
             </a:ext>
             <a:ext uri="{91240B29-F687-4f45-9708-019B960494DF}">
-              <a14:hiddenLine xmlns:a14="http://schemas.microsoft.com/office/drawing/2010/main" xmlns="" w="9525">
+              <a14:hiddenLine xmlns:a14="http://schemas.microsoft.com/office/drawing/2010/main" w="9525">
                 <a:solidFill>
                   <a:srgbClr val="000000"/>
                 </a:solidFill>
@@ -2955,6 +4239,9 @@
                 <a:headEnd/>
                 <a:tailEnd/>
               </a14:hiddenLine>
+            </a:ext>
+            <a:ext uri="{FAA26D3D-D897-4be2-8F04-BA451C77F1D7}">
+              <ma14:placeholderFlag xmlns:ma14="http://schemas.microsoft.com/office/mac/drawingml/2011/main" val="1"/>
             </a:ext>
           </a:extLst>
         </p:spPr>
@@ -2997,18 +4284,15 @@
             <a:noFill/>
           </a:ln>
           <a:extLst>
-            <a:ext uri="{FAA26D3D-D897-4be2-8F04-BA451C77F1D7}">
-              <ma14:placeholderFlag xmlns:ma14="http://schemas.microsoft.com/office/mac/drawingml/2011/main" val="1"/>
-            </a:ext>
             <a:ext uri="{909E8E84-426E-40dd-AFC4-6F175D3DCCD1}">
-              <a14:hiddenFill xmlns:a14="http://schemas.microsoft.com/office/drawing/2010/main" xmlns="">
+              <a14:hiddenFill xmlns:a14="http://schemas.microsoft.com/office/drawing/2010/main">
                 <a:solidFill>
                   <a:srgbClr val="FFFFFF"/>
                 </a:solidFill>
               </a14:hiddenFill>
             </a:ext>
             <a:ext uri="{91240B29-F687-4f45-9708-019B960494DF}">
-              <a14:hiddenLine xmlns:a14="http://schemas.microsoft.com/office/drawing/2010/main" xmlns="" w="9525">
+              <a14:hiddenLine xmlns:a14="http://schemas.microsoft.com/office/drawing/2010/main" w="9525">
                 <a:solidFill>
                   <a:srgbClr val="000000"/>
                 </a:solidFill>
@@ -3016,6 +4300,9 @@
                 <a:headEnd/>
                 <a:tailEnd/>
               </a14:hiddenLine>
+            </a:ext>
+            <a:ext uri="{FAA26D3D-D897-4be2-8F04-BA451C77F1D7}">
+              <ma14:placeholderFlag xmlns:ma14="http://schemas.microsoft.com/office/mac/drawingml/2011/main" val="1"/>
             </a:ext>
           </a:extLst>
         </p:spPr>
@@ -3107,7 +4394,7 @@
               <a:pPr>
                 <a:defRPr/>
               </a:pPr>
-              <a:t>11/10/16</a:t>
+              <a:t>11/14/16</a:t>
             </a:fld>
             <a:endParaRPr lang="en-US"/>
           </a:p>
@@ -3687,18 +4974,15 @@
             <a:noFill/>
           </a:ln>
           <a:extLst>
-            <a:ext uri="{FAA26D3D-D897-4be2-8F04-BA451C77F1D7}">
-              <ma14:placeholderFlag xmlns:ma14="http://schemas.microsoft.com/office/mac/drawingml/2011/main" val="1"/>
-            </a:ext>
             <a:ext uri="{909E8E84-426E-40dd-AFC4-6F175D3DCCD1}">
-              <a14:hiddenFill xmlns:a14="http://schemas.microsoft.com/office/drawing/2010/main" xmlns="">
+              <a14:hiddenFill xmlns:a14="http://schemas.microsoft.com/office/drawing/2010/main">
                 <a:solidFill>
                   <a:srgbClr val="FFFFFF"/>
                 </a:solidFill>
               </a14:hiddenFill>
             </a:ext>
             <a:ext uri="{91240B29-F687-4f45-9708-019B960494DF}">
-              <a14:hiddenLine xmlns:a14="http://schemas.microsoft.com/office/drawing/2010/main" xmlns="" w="9525">
+              <a14:hiddenLine xmlns:a14="http://schemas.microsoft.com/office/drawing/2010/main" w="9525">
                 <a:solidFill>
                   <a:srgbClr val="000000"/>
                 </a:solidFill>
@@ -3706,6 +4990,9 @@
                 <a:headEnd/>
                 <a:tailEnd/>
               </a14:hiddenLine>
+            </a:ext>
+            <a:ext uri="{FAA26D3D-D897-4be2-8F04-BA451C77F1D7}">
+              <ma14:placeholderFlag xmlns:ma14="http://schemas.microsoft.com/office/mac/drawingml/2011/main" val="1"/>
             </a:ext>
           </a:extLst>
         </p:spPr>
@@ -3832,6 +5119,65 @@
                 <a:latin typeface="Calibri" charset="0"/>
               </a:rPr>
               <a:t>http://meetings.cshl.edu/courses.html</a:t>
+            </a:r>
+          </a:p>
+        </p:txBody>
+      </p:sp>
+    </p:spTree>
+  </p:cSld>
+  <p:clrMapOvr>
+    <a:masterClrMapping/>
+  </p:clrMapOvr>
+</p:sld>
+</file>
+
+<file path=ppt/slides/slide10.xml><?xml version="1.0" encoding="utf-8"?>
+<p:sld xmlns:a="http://schemas.openxmlformats.org/drawingml/2006/main" xmlns:r="http://schemas.openxmlformats.org/officeDocument/2006/relationships" xmlns:p="http://schemas.openxmlformats.org/presentationml/2006/main">
+  <p:cSld>
+    <p:spTree>
+      <p:nvGrpSpPr>
+        <p:cNvPr id="1" name=""/>
+        <p:cNvGrpSpPr/>
+        <p:nvPr/>
+      </p:nvGrpSpPr>
+      <p:grpSpPr>
+        <a:xfrm>
+          <a:off x="0" y="0"/>
+          <a:ext cx="0" cy="0"/>
+          <a:chOff x="0" y="0"/>
+          <a:chExt cx="0" cy="0"/>
+        </a:xfrm>
+      </p:grpSpPr>
+      <p:sp>
+        <p:nvSpPr>
+          <p:cNvPr id="11265" name="Content Placeholder 3"/>
+          <p:cNvSpPr>
+            <a:spLocks noGrp="1"/>
+          </p:cNvSpPr>
+          <p:nvPr>
+            <p:ph idx="1"/>
+          </p:nvPr>
+        </p:nvSpPr>
+        <p:spPr>
+          <a:xfrm>
+            <a:off x="152400" y="2667000"/>
+            <a:ext cx="8839200" cy="1600200"/>
+          </a:xfrm>
+        </p:spPr>
+        <p:txBody>
+          <a:bodyPr/>
+          <a:lstStyle/>
+          <a:p>
+            <a:pPr algn="ctr">
+              <a:buFont typeface="Arial" charset="0"/>
+              <a:buNone/>
+            </a:pPr>
+            <a:r>
+              <a:rPr lang="en-US" sz="4400">
+                <a:latin typeface="Calibri" charset="0"/>
+                <a:ea typeface="ＭＳ Ｐゴシック" charset="0"/>
+              </a:rPr>
+              <a:t>Break</a:t>
             </a:r>
           </a:p>
         </p:txBody>
@@ -3951,14 +5297,14 @@
           </a:ln>
           <a:extLst>
             <a:ext uri="{909E8E84-426E-40dd-AFC4-6F175D3DCCD1}">
-              <a14:hiddenFill xmlns:a14="http://schemas.microsoft.com/office/drawing/2010/main" xmlns="">
+              <a14:hiddenFill xmlns:a14="http://schemas.microsoft.com/office/drawing/2010/main">
                 <a:solidFill>
                   <a:srgbClr val="FFFFFF"/>
                 </a:solidFill>
               </a14:hiddenFill>
             </a:ext>
             <a:ext uri="{91240B29-F687-4f45-9708-019B960494DF}">
-              <a14:hiddenLine xmlns:a14="http://schemas.microsoft.com/office/drawing/2010/main" xmlns="" w="9525">
+              <a14:hiddenLine xmlns:a14="http://schemas.microsoft.com/office/drawing/2010/main" w="9525">
                 <a:solidFill>
                   <a:srgbClr val="000000"/>
                 </a:solidFill>
@@ -4005,14 +5351,14 @@
           </a:ln>
           <a:extLst>
             <a:ext uri="{909E8E84-426E-40dd-AFC4-6F175D3DCCD1}">
-              <a14:hiddenFill xmlns:a14="http://schemas.microsoft.com/office/drawing/2010/main" xmlns="">
+              <a14:hiddenFill xmlns:a14="http://schemas.microsoft.com/office/drawing/2010/main">
                 <a:solidFill>
                   <a:srgbClr val="FFFFFF"/>
                 </a:solidFill>
               </a14:hiddenFill>
             </a:ext>
             <a:ext uri="{91240B29-F687-4f45-9708-019B960494DF}">
-              <a14:hiddenLine xmlns:a14="http://schemas.microsoft.com/office/drawing/2010/main" xmlns="" w="9525">
+              <a14:hiddenLine xmlns:a14="http://schemas.microsoft.com/office/drawing/2010/main" w="9525">
                 <a:solidFill>
                   <a:srgbClr val="000000"/>
                 </a:solidFill>
@@ -4046,14 +5392,14 @@
           </a:ln>
           <a:extLst>
             <a:ext uri="{909E8E84-426E-40dd-AFC4-6F175D3DCCD1}">
-              <a14:hiddenFill xmlns:a14="http://schemas.microsoft.com/office/drawing/2010/main" xmlns="">
+              <a14:hiddenFill xmlns:a14="http://schemas.microsoft.com/office/drawing/2010/main">
                 <a:solidFill>
                   <a:srgbClr val="FFFFFF"/>
                 </a:solidFill>
               </a14:hiddenFill>
             </a:ext>
             <a:ext uri="{91240B29-F687-4f45-9708-019B960494DF}">
-              <a14:hiddenLine xmlns:a14="http://schemas.microsoft.com/office/drawing/2010/main" xmlns="" w="9525">
+              <a14:hiddenLine xmlns:a14="http://schemas.microsoft.com/office/drawing/2010/main" w="9525">
                 <a:solidFill>
                   <a:srgbClr val="000000"/>
                 </a:solidFill>
@@ -4177,7 +5523,7 @@
           <a:p>
             <a:pPr algn="r" eaLnBrk="1" hangingPunct="1"/>
             <a:r>
-              <a:rPr lang="en-US" sz="2000" dirty="0" smtClean="0">
+              <a:rPr lang="en-US" sz="2000" dirty="0">
                 <a:solidFill>
                   <a:schemeClr val="bg1"/>
                 </a:solidFill>
@@ -4194,37 +5540,17 @@
                 <a:latin typeface="Calibri" charset="0"/>
                 <a:cs typeface="Segoe UI" charset="0"/>
               </a:rPr>
-              <a:t>S</a:t>
-            </a:r>
-            <a:r>
-              <a:rPr lang="en-US" sz="2000" dirty="0" err="1" smtClean="0">
+              <a:t>Seq</a:t>
+            </a:r>
+            <a:r>
+              <a:rPr lang="en-US" sz="2000" dirty="0">
                 <a:solidFill>
                   <a:schemeClr val="bg1"/>
                 </a:solidFill>
                 <a:latin typeface="Calibri" charset="0"/>
                 <a:cs typeface="Segoe UI" charset="0"/>
               </a:rPr>
-              <a:t>eq</a:t>
-            </a:r>
-            <a:r>
-              <a:rPr lang="en-US" sz="2000" dirty="0" smtClean="0">
-                <a:solidFill>
-                  <a:schemeClr val="bg1"/>
-                </a:solidFill>
-                <a:latin typeface="Calibri" charset="0"/>
-                <a:cs typeface="Segoe UI" charset="0"/>
-              </a:rPr>
-              <a:t> Module </a:t>
-            </a:r>
-            <a:r>
-              <a:rPr lang="en-US" sz="2000" dirty="0">
-                <a:solidFill>
-                  <a:schemeClr val="bg1"/>
-                </a:solidFill>
-                <a:latin typeface="Calibri" charset="0"/>
-                <a:cs typeface="Segoe UI" charset="0"/>
-              </a:rPr>
-              <a:t>1</a:t>
+              <a:t> Module 2</a:t>
             </a:r>
             <a:br>
               <a:rPr lang="en-US" sz="2000" dirty="0">
@@ -4243,7 +5569,7 @@
                 <a:latin typeface="Calibri" charset="0"/>
                 <a:cs typeface="Segoe UI" charset="0"/>
               </a:rPr>
-              <a:t>Introduction to RNA sequencing (lecture)</a:t>
+              <a:t>Alignment and Visualization (tutorial)</a:t>
             </a:r>
             <a:endParaRPr lang="en-US" sz="1800" b="1" dirty="0">
               <a:solidFill>
@@ -4297,21 +5623,8 @@
                 <a:ea typeface="+mj-ea"/>
                 <a:cs typeface="Calibri"/>
               </a:rPr>
-              <a:t>Malachi Griffith, Obi Griffith, Jason </a:t>
-            </a:r>
-            <a:r>
-              <a:rPr lang="en-US" sz="1600" dirty="0" smtClean="0">
-                <a:latin typeface="Calibri"/>
-                <a:ea typeface="+mj-ea"/>
-                <a:cs typeface="Calibri"/>
-              </a:rPr>
-              <a:t>Walker, Alex Wagner</a:t>
-            </a:r>
-            <a:endParaRPr lang="en-US" sz="1600" dirty="0" smtClean="0">
-              <a:latin typeface="Calibri"/>
-              <a:ea typeface="+mj-ea"/>
-              <a:cs typeface="Calibri"/>
-            </a:endParaRPr>
+              <a:t>Malachi Griffith, Obi Griffith, Jason Walker, Alex Wagner</a:t>
+            </a:r>
           </a:p>
           <a:p>
             <a:pPr fontAlgn="auto">
@@ -4404,18 +5717,6 @@
               </a:rPr>
               <a:t>20, 2016</a:t>
             </a:r>
-            <a:endParaRPr lang="en-US" sz="1400" dirty="0" smtClean="0">
-              <a:ln w="1270">
-                <a:solidFill>
-                  <a:schemeClr val="tx1">
-                    <a:alpha val="38000"/>
-                  </a:schemeClr>
-                </a:solidFill>
-              </a:ln>
-              <a:latin typeface="Calibri"/>
-              <a:ea typeface="+mn-ea"/>
-              <a:cs typeface="Calibri"/>
-            </a:endParaRPr>
           </a:p>
         </p:txBody>
       </p:sp>
@@ -4432,7 +5733,7 @@
   <p:timing>
     <p:tnLst>
       <p:par>
-        <p:cTn id="1" dur="indefinite" restart="never" nodeType="tmRoot"/>
+        <p:cTn xmlns:p14="http://schemas.microsoft.com/office/powerpoint/2010/main" id="1" dur="indefinite" restart="never" nodeType="tmRoot"/>
       </p:par>
     </p:tnLst>
   </p:timing>
@@ -4458,7 +5759,39 @@
       </p:grpSpPr>
       <p:sp>
         <p:nvSpPr>
-          <p:cNvPr id="11265" name="Content Placeholder 3"/>
+          <p:cNvPr id="12289" name="Rectangle 2"/>
+          <p:cNvSpPr>
+            <a:spLocks noGrp="1" noChangeArrowheads="1"/>
+          </p:cNvSpPr>
+          <p:nvPr>
+            <p:ph type="title"/>
+          </p:nvPr>
+        </p:nvSpPr>
+        <p:spPr>
+          <a:xfrm>
+            <a:off x="152400" y="44450"/>
+            <a:ext cx="8839200" cy="1143000"/>
+          </a:xfrm>
+        </p:spPr>
+        <p:txBody>
+          <a:bodyPr/>
+          <a:lstStyle/>
+          <a:p>
+            <a:pPr eaLnBrk="1" hangingPunct="1"/>
+            <a:r>
+              <a:rPr lang="en-US" altLang="ko-KR">
+                <a:latin typeface="Calibri" charset="0"/>
+                <a:ea typeface="ＭＳ Ｐゴシック" charset="0"/>
+                <a:cs typeface="ＭＳ Ｐゴシック" charset="0"/>
+              </a:rPr>
+              <a:t>Learning Objectives of Tutorial</a:t>
+            </a:r>
+          </a:p>
+        </p:txBody>
+      </p:sp>
+      <p:sp>
+        <p:nvSpPr>
+          <p:cNvPr id="12290" name="Content Placeholder 6"/>
           <p:cNvSpPr>
             <a:spLocks noGrp="1"/>
           </p:cNvSpPr>
@@ -4468,29 +5801,1701 @@
         </p:nvSpPr>
         <p:spPr>
           <a:xfrm>
-            <a:off x="152400" y="2667000"/>
-            <a:ext cx="8839200" cy="1600200"/>
+            <a:off x="179388" y="981075"/>
+            <a:ext cx="8856662" cy="5184775"/>
           </a:xfrm>
         </p:spPr>
         <p:txBody>
           <a:bodyPr/>
           <a:lstStyle/>
           <a:p>
-            <a:pPr algn="ctr">
-              <a:buFont typeface="Arial" charset="0"/>
-              <a:buNone/>
-            </a:pPr>
-            <a:r>
-              <a:rPr lang="en-US" sz="4400">
-                <a:latin typeface="Calibri" charset="0"/>
-                <a:ea typeface="ＭＳ Ｐゴシック" charset="0"/>
-              </a:rPr>
-              <a:t>Break</a:t>
+            <a:endParaRPr lang="en-US" dirty="0">
+              <a:latin typeface="Calibri" charset="0"/>
+              <a:ea typeface="ＭＳ Ｐゴシック" charset="0"/>
+            </a:endParaRPr>
+          </a:p>
+          <a:p>
+            <a:r>
+              <a:rPr lang="en-US" dirty="0">
+                <a:latin typeface="Calibri" charset="0"/>
+                <a:ea typeface="ＭＳ Ｐゴシック" charset="0"/>
+              </a:rPr>
+              <a:t>Run </a:t>
+            </a:r>
+            <a:r>
+              <a:rPr lang="en-US" dirty="0" smtClean="0">
+                <a:latin typeface="Calibri" charset="0"/>
+                <a:ea typeface="ＭＳ Ｐゴシック" charset="0"/>
+              </a:rPr>
+              <a:t>HISAT2 </a:t>
+            </a:r>
+            <a:r>
+              <a:rPr lang="en-US" dirty="0">
+                <a:latin typeface="Calibri" charset="0"/>
+                <a:ea typeface="ＭＳ Ｐゴシック" charset="0"/>
+              </a:rPr>
+              <a:t>with parameters suitable for gene expression analysis</a:t>
+            </a:r>
+          </a:p>
+          <a:p>
+            <a:r>
+              <a:rPr lang="en-US" dirty="0">
+                <a:latin typeface="Calibri" charset="0"/>
+                <a:ea typeface="ＭＳ Ｐゴシック" charset="0"/>
+              </a:rPr>
+              <a:t>Use </a:t>
+            </a:r>
+            <a:r>
+              <a:rPr lang="en-US" dirty="0" err="1">
+                <a:latin typeface="Calibri" charset="0"/>
+                <a:ea typeface="ＭＳ Ｐゴシック" charset="0"/>
+              </a:rPr>
+              <a:t>samtools</a:t>
+            </a:r>
+            <a:r>
+              <a:rPr lang="en-US" dirty="0">
+                <a:latin typeface="Calibri" charset="0"/>
+                <a:ea typeface="ＭＳ Ｐゴシック" charset="0"/>
+              </a:rPr>
+              <a:t> to demonstrate the features of the SAM/BAM format and basic manipulation of these alignment files (view, sort, index, filter)</a:t>
+            </a:r>
+          </a:p>
+          <a:p>
+            <a:r>
+              <a:rPr lang="en-US" dirty="0">
+                <a:latin typeface="Calibri" charset="0"/>
+                <a:ea typeface="ＭＳ Ｐゴシック" charset="0"/>
+              </a:rPr>
+              <a:t>Use IGV to visualize RNA-</a:t>
+            </a:r>
+            <a:r>
+              <a:rPr lang="en-US" dirty="0" err="1">
+                <a:latin typeface="Calibri" charset="0"/>
+                <a:ea typeface="ＭＳ Ｐゴシック" charset="0"/>
+              </a:rPr>
+              <a:t>seq</a:t>
+            </a:r>
+            <a:r>
+              <a:rPr lang="en-US" dirty="0">
+                <a:latin typeface="Calibri" charset="0"/>
+                <a:ea typeface="ＭＳ Ｐゴシック" charset="0"/>
+              </a:rPr>
+              <a:t> alignments, view a variant position, etc.</a:t>
+            </a:r>
+          </a:p>
+          <a:p>
+            <a:r>
+              <a:rPr lang="en-US" dirty="0">
+                <a:latin typeface="Calibri" charset="0"/>
+                <a:ea typeface="ＭＳ Ｐゴシック" charset="0"/>
+              </a:rPr>
+              <a:t>Determine BAM-read counts at a variant position</a:t>
+            </a:r>
+          </a:p>
+          <a:p>
+            <a:r>
+              <a:rPr lang="en-US" dirty="0">
+                <a:latin typeface="Calibri" charset="0"/>
+                <a:ea typeface="ＭＳ Ｐゴシック" charset="0"/>
+              </a:rPr>
+              <a:t>Use </a:t>
+            </a:r>
+            <a:r>
+              <a:rPr lang="en-US" dirty="0" err="1">
+                <a:latin typeface="Calibri" charset="0"/>
+                <a:ea typeface="ＭＳ Ｐゴシック" charset="0"/>
+              </a:rPr>
+              <a:t>samtools</a:t>
+            </a:r>
+            <a:r>
+              <a:rPr lang="en-US" dirty="0">
+                <a:latin typeface="Calibri" charset="0"/>
+                <a:ea typeface="ＭＳ Ｐゴシック" charset="0"/>
+              </a:rPr>
+              <a:t> </a:t>
+            </a:r>
+            <a:r>
+              <a:rPr lang="en-US" dirty="0" err="1">
+                <a:latin typeface="Calibri" charset="0"/>
+                <a:ea typeface="ＭＳ Ｐゴシック" charset="0"/>
+              </a:rPr>
+              <a:t>flagstat</a:t>
+            </a:r>
+            <a:r>
+              <a:rPr lang="en-US" dirty="0">
+                <a:latin typeface="Calibri" charset="0"/>
+                <a:ea typeface="ＭＳ Ｐゴシック" charset="0"/>
+              </a:rPr>
+              <a:t>, </a:t>
+            </a:r>
+            <a:r>
+              <a:rPr lang="en-US" dirty="0" err="1">
+                <a:latin typeface="Calibri" charset="0"/>
+                <a:ea typeface="ＭＳ Ｐゴシック" charset="0"/>
+              </a:rPr>
+              <a:t>samstat</a:t>
+            </a:r>
+            <a:r>
+              <a:rPr lang="en-US" dirty="0">
+                <a:latin typeface="Calibri" charset="0"/>
+                <a:ea typeface="ＭＳ Ｐゴシック" charset="0"/>
+              </a:rPr>
+              <a:t>, </a:t>
+            </a:r>
+            <a:r>
+              <a:rPr lang="en-US" dirty="0" err="1">
+                <a:latin typeface="Calibri" charset="0"/>
+                <a:ea typeface="ＭＳ Ｐゴシック" charset="0"/>
+              </a:rPr>
+              <a:t>FastQC</a:t>
+            </a:r>
+            <a:r>
+              <a:rPr lang="en-US" dirty="0">
+                <a:latin typeface="Calibri" charset="0"/>
+                <a:ea typeface="ＭＳ Ｐゴシック" charset="0"/>
+              </a:rPr>
+              <a:t> to assess quality of alignments</a:t>
             </a:r>
           </a:p>
         </p:txBody>
       </p:sp>
     </p:spTree>
+    <p:extLst>
+      <p:ext uri="{BB962C8B-B14F-4D97-AF65-F5344CB8AC3E}">
+        <p14:creationId xmlns:p14="http://schemas.microsoft.com/office/powerpoint/2010/main" val="3009918252"/>
+      </p:ext>
+    </p:extLst>
+  </p:cSld>
+  <p:clrMapOvr>
+    <a:masterClrMapping/>
+  </p:clrMapOvr>
+  <p:timing>
+    <p:tnLst>
+      <p:par>
+        <p:cTn xmlns:p14="http://schemas.microsoft.com/office/powerpoint/2010/main" id="1" dur="indefinite" restart="never" nodeType="tmRoot"/>
+      </p:par>
+    </p:tnLst>
+  </p:timing>
+</p:sld>
+</file>
+
+<file path=ppt/slides/slide4.xml><?xml version="1.0" encoding="utf-8"?>
+<p:sld xmlns:a="http://schemas.openxmlformats.org/drawingml/2006/main" xmlns:r="http://schemas.openxmlformats.org/officeDocument/2006/relationships" xmlns:p="http://schemas.openxmlformats.org/presentationml/2006/main">
+  <p:cSld>
+    <p:spTree>
+      <p:nvGrpSpPr>
+        <p:cNvPr id="1" name=""/>
+        <p:cNvGrpSpPr/>
+        <p:nvPr/>
+      </p:nvGrpSpPr>
+      <p:grpSpPr>
+        <a:xfrm>
+          <a:off x="0" y="0"/>
+          <a:ext cx="0" cy="0"/>
+          <a:chOff x="0" y="0"/>
+          <a:chExt cx="0" cy="0"/>
+        </a:xfrm>
+      </p:grpSpPr>
+      <p:sp>
+        <p:nvSpPr>
+          <p:cNvPr id="15361" name="Rectangle 2"/>
+          <p:cNvSpPr>
+            <a:spLocks noGrp="1" noChangeArrowheads="1"/>
+          </p:cNvSpPr>
+          <p:nvPr>
+            <p:ph type="title"/>
+          </p:nvPr>
+        </p:nvSpPr>
+        <p:spPr>
+          <a:xfrm>
+            <a:off x="152400" y="44450"/>
+            <a:ext cx="8839200" cy="1143000"/>
+          </a:xfrm>
+        </p:spPr>
+        <p:txBody>
+          <a:bodyPr/>
+          <a:lstStyle/>
+          <a:p>
+            <a:pPr eaLnBrk="1" hangingPunct="1"/>
+            <a:r>
+              <a:rPr lang="en-US" altLang="ko-KR" dirty="0">
+                <a:latin typeface="Calibri" charset="0"/>
+                <a:ea typeface="ＭＳ Ｐゴシック" charset="0"/>
+                <a:cs typeface="ＭＳ Ｐゴシック" charset="0"/>
+              </a:rPr>
+              <a:t>2</a:t>
+            </a:r>
+            <a:r>
+              <a:rPr lang="en-US" altLang="ko-KR" dirty="0" smtClean="0">
+                <a:latin typeface="Calibri" charset="0"/>
+                <a:ea typeface="ＭＳ Ｐゴシック" charset="0"/>
+                <a:cs typeface="ＭＳ Ｐゴシック" charset="0"/>
+              </a:rPr>
+              <a:t>-i. </a:t>
+            </a:r>
+            <a:r>
+              <a:rPr lang="en-US" altLang="ko-KR" dirty="0" smtClean="0">
+                <a:latin typeface="Calibri" charset="0"/>
+                <a:ea typeface="ＭＳ Ｐゴシック" charset="0"/>
+                <a:cs typeface="ＭＳ Ｐゴシック" charset="0"/>
+              </a:rPr>
+              <a:t>Adaptor trim</a:t>
+            </a:r>
+            <a:endParaRPr lang="en-US" altLang="ko-KR" dirty="0">
+              <a:latin typeface="Calibri" charset="0"/>
+              <a:ea typeface="ＭＳ Ｐゴシック" charset="0"/>
+              <a:cs typeface="ＭＳ Ｐゴシック" charset="0"/>
+            </a:endParaRPr>
+          </a:p>
+        </p:txBody>
+      </p:sp>
+      <p:sp>
+        <p:nvSpPr>
+          <p:cNvPr id="4" name="Content Placeholder 6"/>
+          <p:cNvSpPr>
+            <a:spLocks noGrp="1"/>
+          </p:cNvSpPr>
+          <p:nvPr>
+            <p:ph idx="1"/>
+          </p:nvPr>
+        </p:nvSpPr>
+        <p:spPr>
+          <a:xfrm>
+            <a:off x="152400" y="1268413"/>
+            <a:ext cx="8839200" cy="4979987"/>
+          </a:xfrm>
+        </p:spPr>
+        <p:txBody>
+          <a:bodyPr/>
+          <a:lstStyle/>
+          <a:p>
+            <a:pPr>
+              <a:lnSpc>
+                <a:spcPct val="80000"/>
+              </a:lnSpc>
+            </a:pPr>
+            <a:r>
+              <a:rPr lang="en-US" sz="2600" dirty="0" smtClean="0">
+                <a:latin typeface="Calibri" charset="0"/>
+                <a:ea typeface="ＭＳ Ｐゴシック" charset="0"/>
+              </a:rPr>
+              <a:t>Use </a:t>
+            </a:r>
+            <a:r>
+              <a:rPr lang="en-US" sz="2600" dirty="0" err="1">
+                <a:latin typeface="Calibri" charset="0"/>
+                <a:ea typeface="ＭＳ Ｐゴシック" charset="0"/>
+              </a:rPr>
+              <a:t>Flexbar</a:t>
+            </a:r>
+            <a:r>
+              <a:rPr lang="en-US" sz="2600" dirty="0">
+                <a:latin typeface="Calibri" charset="0"/>
+                <a:ea typeface="ＭＳ Ｐゴシック" charset="0"/>
+              </a:rPr>
+              <a:t> to trim sequence adapter from the read FASTQ </a:t>
+            </a:r>
+            <a:r>
+              <a:rPr lang="en-US" sz="2600" dirty="0" smtClean="0">
+                <a:latin typeface="Calibri" charset="0"/>
+                <a:ea typeface="ＭＳ Ｐゴシック" charset="0"/>
+              </a:rPr>
+              <a:t>files</a:t>
+            </a:r>
+          </a:p>
+          <a:p>
+            <a:pPr lvl="1">
+              <a:lnSpc>
+                <a:spcPct val="80000"/>
+              </a:lnSpc>
+            </a:pPr>
+            <a:r>
+              <a:rPr lang="en-US" sz="2200" dirty="0">
+                <a:latin typeface="Calibri" charset="0"/>
+                <a:ea typeface="ＭＳ Ｐゴシック" charset="0"/>
+              </a:rPr>
+              <a:t>The output of this step will be trimmed FASTQ files for each data set</a:t>
+            </a:r>
+            <a:r>
+              <a:rPr lang="en-US" sz="2200" dirty="0" smtClean="0">
+                <a:latin typeface="Calibri" charset="0"/>
+                <a:ea typeface="ＭＳ Ｐゴシック" charset="0"/>
+              </a:rPr>
+              <a:t>.</a:t>
+            </a:r>
+          </a:p>
+          <a:p>
+            <a:pPr>
+              <a:lnSpc>
+                <a:spcPct val="80000"/>
+              </a:lnSpc>
+            </a:pPr>
+            <a:r>
+              <a:rPr lang="en-US" sz="2600" dirty="0">
+                <a:latin typeface="Calibri" charset="0"/>
+                <a:ea typeface="ＭＳ Ｐゴシック" charset="0"/>
+              </a:rPr>
+              <a:t>Compare the </a:t>
+            </a:r>
+            <a:r>
+              <a:rPr lang="en-US" sz="2600" dirty="0" err="1">
+                <a:latin typeface="Calibri" charset="0"/>
+                <a:ea typeface="ＭＳ Ｐゴシック" charset="0"/>
+              </a:rPr>
+              <a:t>FastQC</a:t>
+            </a:r>
+            <a:r>
+              <a:rPr lang="en-US" sz="2600" dirty="0">
+                <a:latin typeface="Calibri" charset="0"/>
+                <a:ea typeface="ＭＳ Ｐゴシック" charset="0"/>
+              </a:rPr>
+              <a:t> reports for </a:t>
+            </a:r>
+            <a:r>
+              <a:rPr lang="en-US" sz="2600" dirty="0" err="1">
+                <a:latin typeface="Calibri" charset="0"/>
+                <a:ea typeface="ＭＳ Ｐゴシック" charset="0"/>
+              </a:rPr>
+              <a:t>fastq</a:t>
+            </a:r>
+            <a:r>
+              <a:rPr lang="en-US" sz="2600" dirty="0">
+                <a:latin typeface="Calibri" charset="0"/>
+                <a:ea typeface="ＭＳ Ｐゴシック" charset="0"/>
+              </a:rPr>
+              <a:t> files before and after </a:t>
+            </a:r>
+            <a:r>
+              <a:rPr lang="en-US" sz="2600" dirty="0" smtClean="0">
+                <a:latin typeface="Calibri" charset="0"/>
+                <a:ea typeface="ＭＳ Ｐゴシック" charset="0"/>
+              </a:rPr>
+              <a:t>trimming</a:t>
+            </a:r>
+          </a:p>
+          <a:p>
+            <a:pPr>
+              <a:lnSpc>
+                <a:spcPct val="80000"/>
+              </a:lnSpc>
+            </a:pPr>
+            <a:r>
+              <a:rPr lang="en-US" sz="2600" dirty="0">
+                <a:latin typeface="Calibri" charset="0"/>
+                <a:ea typeface="ＭＳ Ｐゴシック" charset="0"/>
+                <a:hlinkClick r:id="rId3"/>
+              </a:rPr>
+              <a:t>http://sourceforge.net/projects/flexbar</a:t>
+            </a:r>
+            <a:r>
+              <a:rPr lang="en-US" sz="2600" dirty="0" smtClean="0">
+                <a:latin typeface="Calibri" charset="0"/>
+                <a:ea typeface="ＭＳ Ｐゴシック" charset="0"/>
+                <a:hlinkClick r:id="rId3"/>
+              </a:rPr>
+              <a:t>/</a:t>
+            </a:r>
+            <a:r>
+              <a:rPr lang="en-US" sz="2600" dirty="0" smtClean="0">
+                <a:latin typeface="Calibri" charset="0"/>
+                <a:ea typeface="ＭＳ Ｐゴシック" charset="0"/>
+              </a:rPr>
+              <a:t> </a:t>
+            </a:r>
+          </a:p>
+          <a:p>
+            <a:pPr>
+              <a:lnSpc>
+                <a:spcPct val="80000"/>
+              </a:lnSpc>
+            </a:pPr>
+            <a:endParaRPr lang="en-US" sz="2200" dirty="0">
+              <a:latin typeface="Calibri" charset="0"/>
+              <a:ea typeface="ＭＳ Ｐゴシック" charset="0"/>
+            </a:endParaRPr>
+          </a:p>
+        </p:txBody>
+      </p:sp>
+    </p:spTree>
+    <p:extLst>
+      <p:ext uri="{BB962C8B-B14F-4D97-AF65-F5344CB8AC3E}">
+        <p14:creationId xmlns:p14="http://schemas.microsoft.com/office/powerpoint/2010/main" val="260201959"/>
+      </p:ext>
+    </p:extLst>
+  </p:cSld>
+  <p:clrMapOvr>
+    <a:masterClrMapping/>
+  </p:clrMapOvr>
+  <p:timing>
+    <p:tnLst>
+      <p:par>
+        <p:cTn xmlns:p14="http://schemas.microsoft.com/office/powerpoint/2010/main" id="1" dur="indefinite" restart="never" nodeType="tmRoot"/>
+      </p:par>
+    </p:tnLst>
+  </p:timing>
+</p:sld>
+</file>
+
+<file path=ppt/slides/slide5.xml><?xml version="1.0" encoding="utf-8"?>
+<p:sld xmlns:a="http://schemas.openxmlformats.org/drawingml/2006/main" xmlns:r="http://schemas.openxmlformats.org/officeDocument/2006/relationships" xmlns:p="http://schemas.openxmlformats.org/presentationml/2006/main">
+  <p:cSld>
+    <p:spTree>
+      <p:nvGrpSpPr>
+        <p:cNvPr id="1" name=""/>
+        <p:cNvGrpSpPr/>
+        <p:nvPr/>
+      </p:nvGrpSpPr>
+      <p:grpSpPr>
+        <a:xfrm>
+          <a:off x="0" y="0"/>
+          <a:ext cx="0" cy="0"/>
+          <a:chOff x="0" y="0"/>
+          <a:chExt cx="0" cy="0"/>
+        </a:xfrm>
+      </p:grpSpPr>
+      <p:sp>
+        <p:nvSpPr>
+          <p:cNvPr id="15361" name="Rectangle 2"/>
+          <p:cNvSpPr>
+            <a:spLocks noGrp="1" noChangeArrowheads="1"/>
+          </p:cNvSpPr>
+          <p:nvPr>
+            <p:ph type="title"/>
+          </p:nvPr>
+        </p:nvSpPr>
+        <p:spPr>
+          <a:xfrm>
+            <a:off x="152400" y="44450"/>
+            <a:ext cx="8839200" cy="1143000"/>
+          </a:xfrm>
+        </p:spPr>
+        <p:txBody>
+          <a:bodyPr/>
+          <a:lstStyle/>
+          <a:p>
+            <a:pPr eaLnBrk="1" hangingPunct="1"/>
+            <a:r>
+              <a:rPr lang="en-US" altLang="ko-KR" dirty="0">
+                <a:latin typeface="Calibri" charset="0"/>
+                <a:ea typeface="ＭＳ Ｐゴシック" charset="0"/>
+                <a:cs typeface="ＭＳ Ｐゴシック" charset="0"/>
+              </a:rPr>
+              <a:t>2</a:t>
+            </a:r>
+            <a:r>
+              <a:rPr lang="en-US" altLang="ko-KR" dirty="0" smtClean="0">
+                <a:latin typeface="Calibri" charset="0"/>
+                <a:ea typeface="ＭＳ Ｐゴシック" charset="0"/>
+                <a:cs typeface="ＭＳ Ｐゴシック" charset="0"/>
+              </a:rPr>
+              <a:t>-ii</a:t>
+            </a:r>
+            <a:r>
+              <a:rPr lang="en-US" altLang="ko-KR" dirty="0" smtClean="0">
+                <a:latin typeface="Calibri" charset="0"/>
+                <a:ea typeface="ＭＳ Ｐゴシック" charset="0"/>
+                <a:cs typeface="ＭＳ Ｐゴシック" charset="0"/>
+              </a:rPr>
+              <a:t>. </a:t>
+            </a:r>
+            <a:r>
+              <a:rPr lang="en-US" altLang="ko-KR" dirty="0">
+                <a:latin typeface="Calibri" charset="0"/>
+                <a:ea typeface="ＭＳ Ｐゴシック" charset="0"/>
+                <a:cs typeface="ＭＳ Ｐゴシック" charset="0"/>
+              </a:rPr>
+              <a:t>Align reads with </a:t>
+            </a:r>
+            <a:r>
+              <a:rPr lang="en-US" altLang="ko-KR" dirty="0" smtClean="0">
+                <a:latin typeface="Calibri" charset="0"/>
+                <a:ea typeface="ＭＳ Ｐゴシック" charset="0"/>
+                <a:cs typeface="ＭＳ Ｐゴシック" charset="0"/>
+              </a:rPr>
+              <a:t>HISAT2</a:t>
+            </a:r>
+            <a:endParaRPr lang="en-US" altLang="ko-KR" dirty="0">
+              <a:latin typeface="Calibri" charset="0"/>
+              <a:ea typeface="ＭＳ Ｐゴシック" charset="0"/>
+              <a:cs typeface="ＭＳ Ｐゴシック" charset="0"/>
+            </a:endParaRPr>
+          </a:p>
+        </p:txBody>
+      </p:sp>
+      <p:sp>
+        <p:nvSpPr>
+          <p:cNvPr id="15362" name="Content Placeholder 6"/>
+          <p:cNvSpPr>
+            <a:spLocks noGrp="1"/>
+          </p:cNvSpPr>
+          <p:nvPr>
+            <p:ph idx="1"/>
+          </p:nvPr>
+        </p:nvSpPr>
+        <p:spPr>
+          <a:xfrm>
+            <a:off x="152400" y="1268413"/>
+            <a:ext cx="8839200" cy="4979987"/>
+          </a:xfrm>
+        </p:spPr>
+        <p:txBody>
+          <a:bodyPr/>
+          <a:lstStyle/>
+          <a:p>
+            <a:pPr>
+              <a:lnSpc>
+                <a:spcPct val="80000"/>
+              </a:lnSpc>
+            </a:pPr>
+            <a:r>
+              <a:rPr lang="en-US" sz="2600" dirty="0">
+                <a:latin typeface="Calibri" charset="0"/>
+                <a:ea typeface="ＭＳ Ｐゴシック" charset="0"/>
+              </a:rPr>
+              <a:t>Align all reads in the </a:t>
+            </a:r>
+            <a:r>
+              <a:rPr lang="en-US" sz="2600" dirty="0" smtClean="0">
+                <a:latin typeface="Calibri" charset="0"/>
+                <a:ea typeface="ＭＳ Ｐゴシック" charset="0"/>
+              </a:rPr>
+              <a:t>6 </a:t>
+            </a:r>
+            <a:r>
+              <a:rPr lang="en-US" sz="2600" dirty="0">
+                <a:latin typeface="Calibri" charset="0"/>
+                <a:ea typeface="ＭＳ Ｐゴシック" charset="0"/>
+              </a:rPr>
+              <a:t>libraries of the test data</a:t>
+            </a:r>
+          </a:p>
+          <a:p>
+            <a:pPr lvl="1">
+              <a:lnSpc>
+                <a:spcPct val="80000"/>
+              </a:lnSpc>
+            </a:pPr>
+            <a:r>
+              <a:rPr lang="en-US" sz="2200" dirty="0" smtClean="0">
+                <a:latin typeface="Calibri" charset="0"/>
+                <a:ea typeface="ＭＳ Ｐゴシック" charset="0"/>
+              </a:rPr>
+              <a:t>6 </a:t>
+            </a:r>
+            <a:r>
+              <a:rPr lang="en-US" sz="2200" dirty="0">
+                <a:latin typeface="Calibri" charset="0"/>
+                <a:ea typeface="ＭＳ Ｐゴシック" charset="0"/>
+              </a:rPr>
+              <a:t>libraries with two files each (one for each read1 and read2 of the paired-end reads)</a:t>
+            </a:r>
+          </a:p>
+          <a:p>
+            <a:pPr>
+              <a:lnSpc>
+                <a:spcPct val="80000"/>
+              </a:lnSpc>
+            </a:pPr>
+            <a:r>
+              <a:rPr lang="en-US" sz="2600" dirty="0">
+                <a:latin typeface="Calibri" charset="0"/>
+                <a:ea typeface="ＭＳ Ｐゴシック" charset="0"/>
+              </a:rPr>
+              <a:t>Use </a:t>
+            </a:r>
+            <a:r>
+              <a:rPr lang="en-US" sz="2600" dirty="0" smtClean="0">
+                <a:latin typeface="Calibri" charset="0"/>
+                <a:ea typeface="ＭＳ Ｐゴシック" charset="0"/>
+              </a:rPr>
+              <a:t>HISAT2 for </a:t>
+            </a:r>
+            <a:r>
+              <a:rPr lang="en-US" sz="2600" dirty="0">
+                <a:latin typeface="Calibri" charset="0"/>
+                <a:ea typeface="ＭＳ Ｐゴシック" charset="0"/>
+              </a:rPr>
+              <a:t>the alignment</a:t>
+            </a:r>
+          </a:p>
+          <a:p>
+            <a:pPr lvl="1">
+              <a:lnSpc>
+                <a:spcPct val="80000"/>
+              </a:lnSpc>
+            </a:pPr>
+            <a:r>
+              <a:rPr lang="en-US" sz="2200" dirty="0" smtClean="0">
+                <a:latin typeface="Calibri" charset="0"/>
+                <a:ea typeface="ＭＳ Ｐゴシック" charset="0"/>
+              </a:rPr>
+              <a:t>Supply </a:t>
+            </a:r>
+            <a:r>
+              <a:rPr lang="en-US" sz="2200" dirty="0">
+                <a:latin typeface="Calibri" charset="0"/>
+                <a:ea typeface="ＭＳ Ｐゴシック" charset="0"/>
+              </a:rPr>
+              <a:t>the bowtie indexed genome obtained in </a:t>
+            </a:r>
+            <a:r>
+              <a:rPr lang="en-US" sz="2200" dirty="0" smtClean="0">
+                <a:latin typeface="Calibri" charset="0"/>
+                <a:ea typeface="ＭＳ Ｐゴシック" charset="0"/>
+              </a:rPr>
+              <a:t>section 1-iv</a:t>
+            </a:r>
+            <a:endParaRPr lang="en-US" sz="2200" dirty="0">
+              <a:latin typeface="Calibri" charset="0"/>
+              <a:ea typeface="ＭＳ Ｐゴシック" charset="0"/>
+            </a:endParaRPr>
+          </a:p>
+          <a:p>
+            <a:pPr lvl="1">
+              <a:lnSpc>
+                <a:spcPct val="80000"/>
+              </a:lnSpc>
+            </a:pPr>
+            <a:r>
+              <a:rPr lang="en-US" sz="2200" dirty="0">
+                <a:latin typeface="Calibri" charset="0"/>
+                <a:ea typeface="ＭＳ Ｐゴシック" charset="0"/>
+              </a:rPr>
+              <a:t>The </a:t>
+            </a:r>
+            <a:r>
+              <a:rPr lang="ja-JP" altLang="en-US" sz="2200" dirty="0">
+                <a:latin typeface="Calibri" charset="0"/>
+                <a:ea typeface="ＭＳ Ｐゴシック" charset="0"/>
+              </a:rPr>
+              <a:t>‘</a:t>
+            </a:r>
+            <a:r>
+              <a:rPr lang="en-US" altLang="ja-JP" sz="2200" dirty="0" smtClean="0">
+                <a:latin typeface="Calibri" charset="0"/>
+                <a:ea typeface="ＭＳ Ｐゴシック" charset="0"/>
+              </a:rPr>
+              <a:t>-</a:t>
+            </a:r>
+            <a:r>
+              <a:rPr lang="en-US" altLang="ja-JP" sz="2200" dirty="0" err="1" smtClean="0">
+                <a:latin typeface="Calibri" charset="0"/>
+                <a:ea typeface="ＭＳ Ｐゴシック" charset="0"/>
+              </a:rPr>
+              <a:t>dta</a:t>
+            </a:r>
+            <a:r>
+              <a:rPr lang="ja-JP" altLang="en-US" sz="2200" dirty="0" smtClean="0">
+                <a:latin typeface="Calibri" charset="0"/>
+                <a:ea typeface="ＭＳ Ｐゴシック" charset="0"/>
+              </a:rPr>
+              <a:t>’</a:t>
+            </a:r>
+            <a:r>
+              <a:rPr lang="en-US" altLang="ja-JP" sz="2200" dirty="0" smtClean="0">
+                <a:latin typeface="Calibri" charset="0"/>
+                <a:ea typeface="ＭＳ Ｐゴシック" charset="0"/>
+              </a:rPr>
+              <a:t> </a:t>
+            </a:r>
+            <a:r>
+              <a:rPr lang="en-US" altLang="ja-JP" sz="2200" dirty="0">
+                <a:latin typeface="Calibri" charset="0"/>
+                <a:ea typeface="ＭＳ Ｐゴシック" charset="0"/>
+              </a:rPr>
+              <a:t>option tells </a:t>
+            </a:r>
+            <a:r>
+              <a:rPr lang="en-US" altLang="ja-JP" sz="2200" dirty="0" smtClean="0">
+                <a:latin typeface="Calibri" charset="0"/>
+                <a:ea typeface="ＭＳ Ｐゴシック" charset="0"/>
+              </a:rPr>
+              <a:t>HISAT2 </a:t>
+            </a:r>
+            <a:r>
+              <a:rPr lang="en-US" altLang="ja-JP" sz="2200" dirty="0">
+                <a:latin typeface="Calibri" charset="0"/>
+                <a:ea typeface="ＭＳ Ｐゴシック" charset="0"/>
+              </a:rPr>
+              <a:t>to report alignments tailored for transcript </a:t>
+            </a:r>
+            <a:r>
+              <a:rPr lang="en-US" altLang="ja-JP" sz="2200" dirty="0" smtClean="0">
+                <a:latin typeface="Calibri" charset="0"/>
+                <a:ea typeface="ＭＳ Ｐゴシック" charset="0"/>
+              </a:rPr>
+              <a:t>assemblers</a:t>
+            </a:r>
+            <a:endParaRPr lang="en-US" altLang="ja-JP" sz="2200" dirty="0">
+              <a:latin typeface="Calibri" charset="0"/>
+              <a:ea typeface="ＭＳ Ｐゴシック" charset="0"/>
+            </a:endParaRPr>
+          </a:p>
+          <a:p>
+            <a:pPr>
+              <a:lnSpc>
+                <a:spcPct val="80000"/>
+              </a:lnSpc>
+            </a:pPr>
+            <a:r>
+              <a:rPr lang="en-US" sz="2600" dirty="0">
+                <a:latin typeface="Calibri" charset="0"/>
+                <a:ea typeface="ＭＳ Ｐゴシック" charset="0"/>
+              </a:rPr>
+              <a:t>Since there are </a:t>
+            </a:r>
+            <a:r>
+              <a:rPr lang="en-US" sz="2600" dirty="0" smtClean="0">
+                <a:latin typeface="Calibri" charset="0"/>
+                <a:ea typeface="ＭＳ Ｐゴシック" charset="0"/>
+              </a:rPr>
+              <a:t>6 </a:t>
+            </a:r>
+            <a:r>
+              <a:rPr lang="en-US" sz="2600" dirty="0">
+                <a:latin typeface="Calibri" charset="0"/>
+                <a:ea typeface="ＭＳ Ｐゴシック" charset="0"/>
+              </a:rPr>
+              <a:t>libraries in the test data set, </a:t>
+            </a:r>
+            <a:r>
+              <a:rPr lang="en-US" sz="2600" dirty="0" smtClean="0">
+                <a:latin typeface="Calibri" charset="0"/>
+                <a:ea typeface="ＭＳ Ｐゴシック" charset="0"/>
+              </a:rPr>
+              <a:t>6 </a:t>
+            </a:r>
+            <a:r>
+              <a:rPr lang="en-US" sz="2600" dirty="0">
+                <a:latin typeface="Calibri" charset="0"/>
+                <a:ea typeface="ＭＳ Ｐゴシック" charset="0"/>
+              </a:rPr>
+              <a:t>alignment commands are run</a:t>
+            </a:r>
+          </a:p>
+          <a:p>
+            <a:pPr>
+              <a:lnSpc>
+                <a:spcPct val="80000"/>
+              </a:lnSpc>
+            </a:pPr>
+            <a:r>
+              <a:rPr lang="en-US" sz="2600" dirty="0">
+                <a:latin typeface="Calibri" charset="0"/>
+                <a:ea typeface="ＭＳ Ｐゴシック" charset="0"/>
+              </a:rPr>
+              <a:t>On a test system, each of these alignments took </a:t>
+            </a:r>
+            <a:r>
+              <a:rPr lang="en-US" sz="2600" dirty="0" smtClean="0">
+                <a:latin typeface="Calibri" charset="0"/>
+                <a:ea typeface="ＭＳ Ｐゴシック" charset="0"/>
+              </a:rPr>
+              <a:t>~4 seconds </a:t>
+            </a:r>
+            <a:r>
+              <a:rPr lang="en-US" sz="2600" dirty="0">
+                <a:latin typeface="Calibri" charset="0"/>
+                <a:ea typeface="ＭＳ Ｐゴシック" charset="0"/>
+              </a:rPr>
+              <a:t>using 8 CPUs</a:t>
+            </a:r>
+          </a:p>
+          <a:p>
+            <a:pPr>
+              <a:lnSpc>
+                <a:spcPct val="80000"/>
+              </a:lnSpc>
+            </a:pPr>
+            <a:r>
+              <a:rPr lang="en-US" sz="2600" dirty="0">
+                <a:latin typeface="Calibri" charset="0"/>
+                <a:ea typeface="ＭＳ Ｐゴシック" charset="0"/>
+              </a:rPr>
+              <a:t>Each alignment job outputs a SAM/BAM file</a:t>
+            </a:r>
+          </a:p>
+          <a:p>
+            <a:pPr lvl="1">
+              <a:lnSpc>
+                <a:spcPct val="80000"/>
+              </a:lnSpc>
+            </a:pPr>
+            <a:r>
+              <a:rPr lang="en-US" sz="2200" dirty="0">
+                <a:latin typeface="Calibri" charset="0"/>
+                <a:ea typeface="ＭＳ Ｐゴシック" charset="0"/>
+                <a:hlinkClick r:id="rId3"/>
+              </a:rPr>
+              <a:t>http://samtools.sourceforge.net/SAM1.pdf</a:t>
+            </a:r>
+            <a:endParaRPr lang="en-US" sz="2200" dirty="0">
+              <a:latin typeface="Calibri" charset="0"/>
+              <a:ea typeface="ＭＳ Ｐゴシック" charset="0"/>
+            </a:endParaRPr>
+          </a:p>
+          <a:p>
+            <a:pPr lvl="1">
+              <a:lnSpc>
+                <a:spcPct val="80000"/>
+              </a:lnSpc>
+            </a:pPr>
+            <a:endParaRPr lang="en-US" sz="2200" dirty="0">
+              <a:latin typeface="Calibri" charset="0"/>
+              <a:ea typeface="ＭＳ Ｐゴシック" charset="0"/>
+            </a:endParaRPr>
+          </a:p>
+        </p:txBody>
+      </p:sp>
+    </p:spTree>
+    <p:extLst>
+      <p:ext uri="{BB962C8B-B14F-4D97-AF65-F5344CB8AC3E}">
+        <p14:creationId xmlns:p14="http://schemas.microsoft.com/office/powerpoint/2010/main" val="2697648456"/>
+      </p:ext>
+    </p:extLst>
+  </p:cSld>
+  <p:clrMapOvr>
+    <a:masterClrMapping/>
+  </p:clrMapOvr>
+  <p:timing>
+    <p:tnLst>
+      <p:par>
+        <p:cTn xmlns:p14="http://schemas.microsoft.com/office/powerpoint/2010/main" id="1" dur="indefinite" restart="never" nodeType="tmRoot"/>
+      </p:par>
+    </p:tnLst>
+  </p:timing>
+</p:sld>
+</file>
+
+<file path=ppt/slides/slide6.xml><?xml version="1.0" encoding="utf-8"?>
+<p:sld xmlns:a="http://schemas.openxmlformats.org/drawingml/2006/main" xmlns:r="http://schemas.openxmlformats.org/officeDocument/2006/relationships" xmlns:p="http://schemas.openxmlformats.org/presentationml/2006/main">
+  <p:cSld>
+    <p:spTree>
+      <p:nvGrpSpPr>
+        <p:cNvPr id="1" name=""/>
+        <p:cNvGrpSpPr/>
+        <p:nvPr/>
+      </p:nvGrpSpPr>
+      <p:grpSpPr>
+        <a:xfrm>
+          <a:off x="0" y="0"/>
+          <a:ext cx="0" cy="0"/>
+          <a:chOff x="0" y="0"/>
+          <a:chExt cx="0" cy="0"/>
+        </a:xfrm>
+      </p:grpSpPr>
+      <p:sp>
+        <p:nvSpPr>
+          <p:cNvPr id="19457" name="Rectangle 2"/>
+          <p:cNvSpPr>
+            <a:spLocks noGrp="1" noChangeArrowheads="1"/>
+          </p:cNvSpPr>
+          <p:nvPr>
+            <p:ph type="title"/>
+          </p:nvPr>
+        </p:nvSpPr>
+        <p:spPr>
+          <a:xfrm>
+            <a:off x="152400" y="44450"/>
+            <a:ext cx="8839200" cy="1143000"/>
+          </a:xfrm>
+        </p:spPr>
+        <p:txBody>
+          <a:bodyPr/>
+          <a:lstStyle/>
+          <a:p>
+            <a:pPr eaLnBrk="1" hangingPunct="1"/>
+            <a:r>
+              <a:rPr lang="en-US" altLang="ko-KR" dirty="0">
+                <a:latin typeface="Calibri" charset="0"/>
+                <a:ea typeface="ＭＳ Ｐゴシック" charset="0"/>
+                <a:cs typeface="ＭＳ Ｐゴシック" charset="0"/>
+              </a:rPr>
+              <a:t>2</a:t>
+            </a:r>
+            <a:r>
+              <a:rPr lang="en-US" altLang="ko-KR" dirty="0" smtClean="0">
+                <a:latin typeface="Calibri" charset="0"/>
+                <a:ea typeface="ＭＳ Ｐゴシック" charset="0"/>
+                <a:cs typeface="ＭＳ Ｐゴシック" charset="0"/>
+              </a:rPr>
+              <a:t>-</a:t>
+            </a:r>
+            <a:r>
+              <a:rPr lang="en-US" altLang="ko-KR" dirty="0" smtClean="0">
+                <a:latin typeface="Calibri" charset="0"/>
+                <a:ea typeface="ＭＳ Ｐゴシック" charset="0"/>
+                <a:cs typeface="ＭＳ Ｐゴシック" charset="0"/>
+              </a:rPr>
+              <a:t>iii. </a:t>
+            </a:r>
+            <a:r>
+              <a:rPr lang="en-US" altLang="ko-KR" dirty="0">
+                <a:latin typeface="Calibri" charset="0"/>
+                <a:ea typeface="ＭＳ Ｐゴシック" charset="0"/>
+                <a:cs typeface="ＭＳ Ｐゴシック" charset="0"/>
+              </a:rPr>
+              <a:t>Post-alignment </a:t>
+            </a:r>
+            <a:r>
+              <a:rPr lang="en-US" altLang="ko-KR" dirty="0" smtClean="0">
+                <a:latin typeface="Calibri" charset="0"/>
+                <a:ea typeface="ＭＳ Ｐゴシック" charset="0"/>
+                <a:cs typeface="ＭＳ Ｐゴシック" charset="0"/>
+              </a:rPr>
+              <a:t>visualization</a:t>
+            </a:r>
+            <a:endParaRPr lang="en-US" altLang="ko-KR" dirty="0">
+              <a:latin typeface="Calibri" charset="0"/>
+              <a:ea typeface="ＭＳ Ｐゴシック" charset="0"/>
+              <a:cs typeface="ＭＳ Ｐゴシック" charset="0"/>
+            </a:endParaRPr>
+          </a:p>
+        </p:txBody>
+      </p:sp>
+      <p:sp>
+        <p:nvSpPr>
+          <p:cNvPr id="19458" name="Content Placeholder 6"/>
+          <p:cNvSpPr>
+            <a:spLocks noGrp="1"/>
+          </p:cNvSpPr>
+          <p:nvPr>
+            <p:ph idx="1"/>
+          </p:nvPr>
+        </p:nvSpPr>
+        <p:spPr>
+          <a:xfrm>
+            <a:off x="152400" y="1268413"/>
+            <a:ext cx="8839200" cy="4979987"/>
+          </a:xfrm>
+        </p:spPr>
+        <p:txBody>
+          <a:bodyPr/>
+          <a:lstStyle/>
+          <a:p>
+            <a:pPr>
+              <a:lnSpc>
+                <a:spcPct val="80000"/>
+              </a:lnSpc>
+            </a:pPr>
+            <a:r>
+              <a:rPr lang="en-US" sz="2600" dirty="0">
+                <a:latin typeface="Calibri" charset="0"/>
+                <a:ea typeface="ＭＳ Ｐゴシック" charset="0"/>
+              </a:rPr>
+              <a:t>Create indexed versions of bam files</a:t>
+            </a:r>
+          </a:p>
+          <a:p>
+            <a:pPr lvl="1">
+              <a:lnSpc>
+                <a:spcPct val="80000"/>
+              </a:lnSpc>
+            </a:pPr>
+            <a:r>
+              <a:rPr lang="en-US" sz="2200" dirty="0">
+                <a:latin typeface="Calibri" charset="0"/>
+                <a:ea typeface="ＭＳ Ｐゴシック" charset="0"/>
+              </a:rPr>
+              <a:t>These are needed by IGV for efficient loading of alignments</a:t>
+            </a:r>
+          </a:p>
+          <a:p>
+            <a:pPr>
+              <a:lnSpc>
+                <a:spcPct val="80000"/>
+              </a:lnSpc>
+            </a:pPr>
+            <a:r>
+              <a:rPr lang="en-US" sz="2600" dirty="0">
+                <a:latin typeface="Calibri" charset="0"/>
+                <a:ea typeface="ＭＳ Ｐゴシック" charset="0"/>
+              </a:rPr>
+              <a:t>Visualize spliced alignments</a:t>
+            </a:r>
+          </a:p>
+          <a:p>
+            <a:pPr lvl="1">
+              <a:lnSpc>
+                <a:spcPct val="80000"/>
+              </a:lnSpc>
+            </a:pPr>
+            <a:r>
+              <a:rPr lang="en-US" sz="2200" dirty="0">
+                <a:latin typeface="Calibri" charset="0"/>
+                <a:ea typeface="ＭＳ Ｐゴシック" charset="0"/>
+              </a:rPr>
+              <a:t>Identify exon-exon junction supporting reads</a:t>
+            </a:r>
+          </a:p>
+          <a:p>
+            <a:pPr lvl="1">
+              <a:lnSpc>
+                <a:spcPct val="80000"/>
+              </a:lnSpc>
+            </a:pPr>
+            <a:r>
+              <a:rPr lang="en-US" sz="2200" dirty="0" smtClean="0">
+                <a:latin typeface="Calibri" charset="0"/>
+                <a:ea typeface="ＭＳ Ｐゴシック" charset="0"/>
+              </a:rPr>
+              <a:t>Identify </a:t>
+            </a:r>
+            <a:r>
+              <a:rPr lang="en-US" sz="2200" dirty="0">
+                <a:latin typeface="Calibri" charset="0"/>
+                <a:ea typeface="ＭＳ Ｐゴシック" charset="0"/>
+              </a:rPr>
+              <a:t>differentially expressed genes</a:t>
+            </a:r>
+          </a:p>
+          <a:p>
+            <a:pPr>
+              <a:lnSpc>
+                <a:spcPct val="80000"/>
+              </a:lnSpc>
+            </a:pPr>
+            <a:r>
+              <a:rPr lang="en-US" sz="2600" dirty="0" smtClean="0">
+                <a:latin typeface="Calibri" charset="0"/>
+                <a:ea typeface="ＭＳ Ｐゴシック" charset="0"/>
+              </a:rPr>
+              <a:t>Try </a:t>
+            </a:r>
+            <a:r>
+              <a:rPr lang="en-US" sz="2600" dirty="0">
+                <a:latin typeface="Calibri" charset="0"/>
+                <a:ea typeface="ＭＳ Ｐゴシック" charset="0"/>
+              </a:rPr>
+              <a:t>to find variant positions</a:t>
+            </a:r>
+          </a:p>
+          <a:p>
+            <a:pPr>
+              <a:lnSpc>
+                <a:spcPct val="80000"/>
+              </a:lnSpc>
+            </a:pPr>
+            <a:endParaRPr lang="en-US" sz="2600" dirty="0">
+              <a:latin typeface="Calibri" charset="0"/>
+              <a:ea typeface="ＭＳ Ｐゴシック" charset="0"/>
+            </a:endParaRPr>
+          </a:p>
+          <a:p>
+            <a:pPr>
+              <a:lnSpc>
+                <a:spcPct val="80000"/>
+              </a:lnSpc>
+            </a:pPr>
+            <a:r>
+              <a:rPr lang="en-US" sz="2600" dirty="0">
+                <a:latin typeface="Calibri" charset="0"/>
+                <a:ea typeface="ＭＳ Ｐゴシック" charset="0"/>
+              </a:rPr>
+              <a:t>Create a pileup from bam file</a:t>
+            </a:r>
+          </a:p>
+          <a:p>
+            <a:pPr>
+              <a:lnSpc>
+                <a:spcPct val="80000"/>
+              </a:lnSpc>
+            </a:pPr>
+            <a:r>
+              <a:rPr lang="en-US" sz="2600" dirty="0">
+                <a:latin typeface="Calibri" charset="0"/>
+                <a:ea typeface="ＭＳ Ｐゴシック" charset="0"/>
+              </a:rPr>
+              <a:t>Determine read counts at a specific position</a:t>
+            </a:r>
+          </a:p>
+        </p:txBody>
+      </p:sp>
+    </p:spTree>
+    <p:extLst>
+      <p:ext uri="{BB962C8B-B14F-4D97-AF65-F5344CB8AC3E}">
+        <p14:creationId xmlns:p14="http://schemas.microsoft.com/office/powerpoint/2010/main" val="1543880734"/>
+      </p:ext>
+    </p:extLst>
+  </p:cSld>
+  <p:clrMapOvr>
+    <a:masterClrMapping/>
+  </p:clrMapOvr>
+  <p:timing>
+    <p:tnLst>
+      <p:par>
+        <p:cTn xmlns:p14="http://schemas.microsoft.com/office/powerpoint/2010/main" id="1" dur="indefinite" restart="never" nodeType="tmRoot"/>
+      </p:par>
+    </p:tnLst>
+  </p:timing>
+</p:sld>
+</file>
+
+<file path=ppt/slides/slide7.xml><?xml version="1.0" encoding="utf-8"?>
+<p:sld xmlns:a="http://schemas.openxmlformats.org/drawingml/2006/main" xmlns:r="http://schemas.openxmlformats.org/officeDocument/2006/relationships" xmlns:p="http://schemas.openxmlformats.org/presentationml/2006/main">
+  <p:cSld>
+    <p:spTree>
+      <p:nvGrpSpPr>
+        <p:cNvPr id="1" name=""/>
+        <p:cNvGrpSpPr/>
+        <p:nvPr/>
+      </p:nvGrpSpPr>
+      <p:grpSpPr>
+        <a:xfrm>
+          <a:off x="0" y="0"/>
+          <a:ext cx="0" cy="0"/>
+          <a:chOff x="0" y="0"/>
+          <a:chExt cx="0" cy="0"/>
+        </a:xfrm>
+      </p:grpSpPr>
+      <p:sp>
+        <p:nvSpPr>
+          <p:cNvPr id="21505" name="Title 1"/>
+          <p:cNvSpPr>
+            <a:spLocks noGrp="1"/>
+          </p:cNvSpPr>
+          <p:nvPr>
+            <p:ph type="title"/>
+          </p:nvPr>
+        </p:nvSpPr>
+        <p:spPr>
+          <a:xfrm>
+            <a:off x="152400" y="44450"/>
+            <a:ext cx="8839200" cy="1143000"/>
+          </a:xfrm>
+        </p:spPr>
+        <p:txBody>
+          <a:bodyPr/>
+          <a:lstStyle/>
+          <a:p>
+            <a:r>
+              <a:rPr lang="en-US" altLang="ko-KR" dirty="0">
+                <a:latin typeface="Calibri" charset="0"/>
+                <a:ea typeface="ＭＳ Ｐゴシック" charset="0"/>
+                <a:cs typeface="ＭＳ Ｐゴシック" charset="0"/>
+              </a:rPr>
+              <a:t>2</a:t>
+            </a:r>
+            <a:r>
+              <a:rPr lang="en-US" altLang="ko-KR" dirty="0" smtClean="0">
+                <a:latin typeface="Calibri" charset="0"/>
+                <a:ea typeface="ＭＳ Ｐゴシック" charset="0"/>
+                <a:cs typeface="ＭＳ Ｐゴシック" charset="0"/>
+              </a:rPr>
+              <a:t>-</a:t>
+            </a:r>
+            <a:r>
+              <a:rPr lang="en-US" altLang="ko-KR" dirty="0" smtClean="0">
+                <a:latin typeface="Calibri" charset="0"/>
+                <a:ea typeface="ＭＳ Ｐゴシック" charset="0"/>
+                <a:cs typeface="ＭＳ Ｐゴシック" charset="0"/>
+              </a:rPr>
+              <a:t>iii. </a:t>
+            </a:r>
+            <a:r>
+              <a:rPr lang="en-US" altLang="ko-KR" dirty="0">
+                <a:latin typeface="Calibri" charset="0"/>
+                <a:ea typeface="ＭＳ Ｐゴシック" charset="0"/>
+                <a:cs typeface="ＭＳ Ｐゴシック" charset="0"/>
+              </a:rPr>
+              <a:t>Post-alignment </a:t>
+            </a:r>
+            <a:r>
+              <a:rPr lang="en-US" altLang="ko-KR" dirty="0" smtClean="0">
+                <a:latin typeface="Calibri" charset="0"/>
+                <a:ea typeface="ＭＳ Ｐゴシック" charset="0"/>
+                <a:cs typeface="ＭＳ Ｐゴシック" charset="0"/>
+              </a:rPr>
+              <a:t>visualization </a:t>
+            </a:r>
+            <a:r>
+              <a:rPr lang="en-US" altLang="ko-KR" dirty="0">
+                <a:latin typeface="Calibri" charset="0"/>
+                <a:ea typeface="ＭＳ Ｐゴシック" charset="0"/>
+                <a:cs typeface="ＭＳ Ｐゴシック" charset="0"/>
+              </a:rPr>
+              <a:t>(IGV)</a:t>
+            </a:r>
+            <a:endParaRPr lang="en-US" dirty="0">
+              <a:latin typeface="Calibri" charset="0"/>
+              <a:ea typeface="ＭＳ Ｐゴシック" charset="0"/>
+            </a:endParaRPr>
+          </a:p>
+        </p:txBody>
+      </p:sp>
+      <p:pic>
+        <p:nvPicPr>
+          <p:cNvPr id="21506" name="Content Placeholder 3" descr="Screen Shot 2013-06-01 at 11.20.52 PM.png"/>
+          <p:cNvPicPr>
+            <a:picLocks noGrp="1" noChangeAspect="1"/>
+          </p:cNvPicPr>
+          <p:nvPr>
+            <p:ph idx="1"/>
+          </p:nvPr>
+        </p:nvPicPr>
+        <p:blipFill>
+          <a:blip r:embed="rId2">
+            <a:extLst>
+              <a:ext uri="{28A0092B-C50C-407E-A947-70E740481C1C}">
+                <a14:useLocalDpi xmlns:a14="http://schemas.microsoft.com/office/drawing/2010/main" val="0"/>
+              </a:ext>
+            </a:extLst>
+          </a:blip>
+          <a:srcRect t="-339" b="-339"/>
+          <a:stretch>
+            <a:fillRect/>
+          </a:stretch>
+        </p:blipFill>
+        <p:spPr>
+          <a:xfrm>
+            <a:off x="152400" y="1341438"/>
+            <a:ext cx="8839200" cy="4724400"/>
+          </a:xfrm>
+        </p:spPr>
+      </p:pic>
+    </p:spTree>
+    <p:extLst>
+      <p:ext uri="{BB962C8B-B14F-4D97-AF65-F5344CB8AC3E}">
+        <p14:creationId xmlns:p14="http://schemas.microsoft.com/office/powerpoint/2010/main" val="528369237"/>
+      </p:ext>
+    </p:extLst>
+  </p:cSld>
+  <p:clrMapOvr>
+    <a:masterClrMapping/>
+  </p:clrMapOvr>
+</p:sld>
+</file>
+
+<file path=ppt/slides/slide8.xml><?xml version="1.0" encoding="utf-8"?>
+<p:sld xmlns:a="http://schemas.openxmlformats.org/drawingml/2006/main" xmlns:r="http://schemas.openxmlformats.org/officeDocument/2006/relationships" xmlns:p="http://schemas.openxmlformats.org/presentationml/2006/main">
+  <p:cSld>
+    <p:spTree>
+      <p:nvGrpSpPr>
+        <p:cNvPr id="1" name=""/>
+        <p:cNvGrpSpPr/>
+        <p:nvPr/>
+      </p:nvGrpSpPr>
+      <p:grpSpPr>
+        <a:xfrm>
+          <a:off x="0" y="0"/>
+          <a:ext cx="0" cy="0"/>
+          <a:chOff x="0" y="0"/>
+          <a:chExt cx="0" cy="0"/>
+        </a:xfrm>
+      </p:grpSpPr>
+      <p:sp>
+        <p:nvSpPr>
+          <p:cNvPr id="22529" name="Rectangle 2"/>
+          <p:cNvSpPr>
+            <a:spLocks noGrp="1" noChangeArrowheads="1"/>
+          </p:cNvSpPr>
+          <p:nvPr>
+            <p:ph type="title"/>
+          </p:nvPr>
+        </p:nvSpPr>
+        <p:spPr>
+          <a:xfrm>
+            <a:off x="152400" y="44450"/>
+            <a:ext cx="8839200" cy="1143000"/>
+          </a:xfrm>
+        </p:spPr>
+        <p:txBody>
+          <a:bodyPr/>
+          <a:lstStyle/>
+          <a:p>
+            <a:pPr eaLnBrk="1" hangingPunct="1"/>
+            <a:r>
+              <a:rPr lang="en-US" altLang="ko-KR" dirty="0">
+                <a:latin typeface="Calibri" charset="0"/>
+                <a:ea typeface="ＭＳ Ｐゴシック" charset="0"/>
+                <a:cs typeface="ＭＳ Ｐゴシック" charset="0"/>
+              </a:rPr>
+              <a:t>2</a:t>
+            </a:r>
+            <a:r>
+              <a:rPr lang="en-US" altLang="ko-KR" dirty="0" smtClean="0">
+                <a:latin typeface="Calibri" charset="0"/>
+                <a:ea typeface="ＭＳ Ｐゴシック" charset="0"/>
+                <a:cs typeface="ＭＳ Ｐゴシック" charset="0"/>
+              </a:rPr>
+              <a:t>-</a:t>
+            </a:r>
+            <a:r>
+              <a:rPr lang="en-US" altLang="ko-KR" dirty="0" smtClean="0">
+                <a:latin typeface="Calibri" charset="0"/>
+                <a:ea typeface="ＭＳ Ｐゴシック" charset="0"/>
+                <a:cs typeface="ＭＳ Ｐゴシック" charset="0"/>
+              </a:rPr>
+              <a:t>iv. </a:t>
+            </a:r>
+            <a:r>
+              <a:rPr lang="en-US" altLang="ko-KR" dirty="0">
+                <a:latin typeface="Calibri" charset="0"/>
+                <a:ea typeface="ＭＳ Ｐゴシック" charset="0"/>
+                <a:cs typeface="ＭＳ Ｐゴシック" charset="0"/>
+              </a:rPr>
+              <a:t>Post-alignment QC</a:t>
+            </a:r>
+          </a:p>
+        </p:txBody>
+      </p:sp>
+      <p:sp>
+        <p:nvSpPr>
+          <p:cNvPr id="22530" name="Content Placeholder 6"/>
+          <p:cNvSpPr>
+            <a:spLocks noGrp="1"/>
+          </p:cNvSpPr>
+          <p:nvPr>
+            <p:ph idx="1"/>
+          </p:nvPr>
+        </p:nvSpPr>
+        <p:spPr>
+          <a:xfrm>
+            <a:off x="152400" y="1268413"/>
+            <a:ext cx="8839200" cy="4979987"/>
+          </a:xfrm>
+        </p:spPr>
+        <p:txBody>
+          <a:bodyPr/>
+          <a:lstStyle/>
+          <a:p>
+            <a:pPr>
+              <a:lnSpc>
+                <a:spcPct val="80000"/>
+              </a:lnSpc>
+            </a:pPr>
+            <a:r>
+              <a:rPr lang="en-US" sz="2600" dirty="0">
+                <a:latin typeface="Calibri" charset="0"/>
+                <a:ea typeface="ＭＳ Ｐゴシック" charset="0"/>
+              </a:rPr>
+              <a:t>Use '</a:t>
+            </a:r>
+            <a:r>
+              <a:rPr lang="en-US" sz="2600" dirty="0" err="1">
+                <a:latin typeface="Calibri" charset="0"/>
+                <a:ea typeface="ＭＳ Ｐゴシック" charset="0"/>
+              </a:rPr>
+              <a:t>samtools</a:t>
+            </a:r>
+            <a:r>
+              <a:rPr lang="en-US" sz="2600" dirty="0">
+                <a:latin typeface="Calibri" charset="0"/>
+                <a:ea typeface="ＭＳ Ｐゴシック" charset="0"/>
+              </a:rPr>
+              <a:t> view' to see the format of a SAM/BAM alignment file</a:t>
+            </a:r>
+          </a:p>
+          <a:p>
+            <a:pPr lvl="1">
+              <a:lnSpc>
+                <a:spcPct val="80000"/>
+              </a:lnSpc>
+            </a:pPr>
+            <a:r>
+              <a:rPr lang="en-US" sz="2200" dirty="0">
+                <a:latin typeface="Calibri" charset="0"/>
+                <a:ea typeface="ＭＳ Ｐゴシック" charset="0"/>
+              </a:rPr>
+              <a:t>Use ‘FLAGs’ to filter out certain kinds of alignments</a:t>
+            </a:r>
+          </a:p>
+          <a:p>
+            <a:pPr>
+              <a:lnSpc>
+                <a:spcPct val="80000"/>
+              </a:lnSpc>
+            </a:pPr>
+            <a:r>
+              <a:rPr lang="en-US" sz="2600" dirty="0">
+                <a:latin typeface="Calibri" charset="0"/>
+                <a:ea typeface="ＭＳ Ｐゴシック" charset="0"/>
+              </a:rPr>
+              <a:t>Use '</a:t>
+            </a:r>
+            <a:r>
+              <a:rPr lang="en-US" sz="2600" dirty="0" err="1">
+                <a:latin typeface="Calibri" charset="0"/>
+                <a:ea typeface="ＭＳ Ｐゴシック" charset="0"/>
+              </a:rPr>
+              <a:t>samtools</a:t>
+            </a:r>
+            <a:r>
+              <a:rPr lang="en-US" sz="2600" dirty="0">
+                <a:latin typeface="Calibri" charset="0"/>
+                <a:ea typeface="ＭＳ Ｐゴシック" charset="0"/>
+              </a:rPr>
+              <a:t> </a:t>
+            </a:r>
+            <a:r>
+              <a:rPr lang="en-US" sz="2600" dirty="0" err="1">
+                <a:latin typeface="Calibri" charset="0"/>
+                <a:ea typeface="ＭＳ Ｐゴシック" charset="0"/>
+              </a:rPr>
+              <a:t>flagstat</a:t>
+            </a:r>
+            <a:r>
+              <a:rPr lang="en-US" sz="2600" dirty="0">
+                <a:latin typeface="Calibri" charset="0"/>
+                <a:ea typeface="ＭＳ Ｐゴシック" charset="0"/>
+              </a:rPr>
+              <a:t>' to get a basic summary of an alignment</a:t>
+            </a:r>
+          </a:p>
+          <a:p>
+            <a:pPr>
+              <a:lnSpc>
+                <a:spcPct val="80000"/>
+              </a:lnSpc>
+            </a:pPr>
+            <a:r>
+              <a:rPr lang="en-US" sz="2600" dirty="0" smtClean="0">
+                <a:latin typeface="Calibri" charset="0"/>
+                <a:ea typeface="ＭＳ Ｐゴシック" charset="0"/>
+              </a:rPr>
+              <a:t>Use </a:t>
+            </a:r>
+            <a:r>
+              <a:rPr lang="en-US" sz="2600" dirty="0" err="1">
+                <a:latin typeface="Calibri" charset="0"/>
+                <a:ea typeface="ＭＳ Ｐゴシック" charset="0"/>
+              </a:rPr>
+              <a:t>FastQC</a:t>
+            </a:r>
+            <a:r>
+              <a:rPr lang="en-US" sz="2600" dirty="0">
+                <a:latin typeface="Calibri" charset="0"/>
+                <a:ea typeface="ＭＳ Ｐゴシック" charset="0"/>
+              </a:rPr>
+              <a:t> to perform basic QC of your </a:t>
+            </a:r>
+            <a:r>
+              <a:rPr lang="en-US" sz="2600" dirty="0" smtClean="0">
+                <a:latin typeface="Calibri" charset="0"/>
+                <a:ea typeface="ＭＳ Ｐゴシック" charset="0"/>
+              </a:rPr>
+              <a:t>alignments</a:t>
+            </a:r>
+          </a:p>
+          <a:p>
+            <a:pPr>
+              <a:lnSpc>
+                <a:spcPct val="80000"/>
+              </a:lnSpc>
+            </a:pPr>
+            <a:endParaRPr lang="en-US" sz="2600" dirty="0">
+              <a:latin typeface="Calibri" charset="0"/>
+              <a:ea typeface="ＭＳ Ｐゴシック" charset="0"/>
+            </a:endParaRPr>
+          </a:p>
+          <a:p>
+            <a:pPr>
+              <a:lnSpc>
+                <a:spcPct val="80000"/>
+              </a:lnSpc>
+            </a:pPr>
+            <a:r>
+              <a:rPr lang="en-US" sz="2600" dirty="0" smtClean="0">
+                <a:latin typeface="Calibri" charset="0"/>
+                <a:ea typeface="ＭＳ Ｐゴシック" charset="0"/>
+              </a:rPr>
+              <a:t>Optional: explore </a:t>
+            </a:r>
+            <a:r>
+              <a:rPr lang="en-US" sz="2600" dirty="0" err="1" smtClean="0">
+                <a:latin typeface="Calibri" charset="0"/>
+                <a:ea typeface="ＭＳ Ｐゴシック" charset="0"/>
+              </a:rPr>
+              <a:t>RSeQC</a:t>
+            </a:r>
+            <a:r>
+              <a:rPr lang="en-US" sz="2600" dirty="0" smtClean="0">
+                <a:latin typeface="Calibri" charset="0"/>
+                <a:ea typeface="ＭＳ Ｐゴシック" charset="0"/>
+              </a:rPr>
+              <a:t> for alignment QC</a:t>
+            </a:r>
+            <a:endParaRPr lang="en-US" sz="2600" dirty="0">
+              <a:latin typeface="Calibri" charset="0"/>
+              <a:ea typeface="ＭＳ Ｐゴシック" charset="0"/>
+            </a:endParaRPr>
+          </a:p>
+        </p:txBody>
+      </p:sp>
+    </p:spTree>
+    <p:extLst>
+      <p:ext uri="{BB962C8B-B14F-4D97-AF65-F5344CB8AC3E}">
+        <p14:creationId xmlns:p14="http://schemas.microsoft.com/office/powerpoint/2010/main" val="4139904758"/>
+      </p:ext>
+    </p:extLst>
+  </p:cSld>
+  <p:clrMapOvr>
+    <a:masterClrMapping/>
+  </p:clrMapOvr>
+  <p:timing>
+    <p:tnLst>
+      <p:par>
+        <p:cTn xmlns:p14="http://schemas.microsoft.com/office/powerpoint/2010/main" id="1" dur="indefinite" restart="never" nodeType="tmRoot"/>
+      </p:par>
+    </p:tnLst>
+  </p:timing>
+</p:sld>
+</file>
+
+<file path=ppt/slides/slide9.xml><?xml version="1.0" encoding="utf-8"?>
+<p:sld xmlns:a="http://schemas.openxmlformats.org/drawingml/2006/main" xmlns:r="http://schemas.openxmlformats.org/officeDocument/2006/relationships" xmlns:p="http://schemas.openxmlformats.org/presentationml/2006/main">
+  <p:cSld>
+    <p:spTree>
+      <p:nvGrpSpPr>
+        <p:cNvPr id="1" name=""/>
+        <p:cNvGrpSpPr/>
+        <p:nvPr/>
+      </p:nvGrpSpPr>
+      <p:grpSpPr>
+        <a:xfrm>
+          <a:off x="0" y="0"/>
+          <a:ext cx="0" cy="0"/>
+          <a:chOff x="0" y="0"/>
+          <a:chExt cx="0" cy="0"/>
+        </a:xfrm>
+      </p:grpSpPr>
+      <p:sp>
+        <p:nvSpPr>
+          <p:cNvPr id="24577" name="Title 1"/>
+          <p:cNvSpPr>
+            <a:spLocks noGrp="1"/>
+          </p:cNvSpPr>
+          <p:nvPr>
+            <p:ph type="title"/>
+          </p:nvPr>
+        </p:nvSpPr>
+        <p:spPr>
+          <a:xfrm>
+            <a:off x="152400" y="44450"/>
+            <a:ext cx="8839200" cy="1143000"/>
+          </a:xfrm>
+        </p:spPr>
+        <p:txBody>
+          <a:bodyPr/>
+          <a:lstStyle/>
+          <a:p>
+            <a:r>
+              <a:rPr lang="en-US" altLang="ko-KR" dirty="0">
+                <a:latin typeface="Calibri" charset="0"/>
+                <a:ea typeface="ＭＳ Ｐゴシック" charset="0"/>
+                <a:cs typeface="ＭＳ Ｐゴシック" charset="0"/>
+              </a:rPr>
+              <a:t>2</a:t>
+            </a:r>
+            <a:r>
+              <a:rPr lang="en-US" altLang="ko-KR" dirty="0" smtClean="0">
+                <a:latin typeface="Calibri" charset="0"/>
+                <a:ea typeface="ＭＳ Ｐゴシック" charset="0"/>
+                <a:cs typeface="ＭＳ Ｐゴシック" charset="0"/>
+              </a:rPr>
+              <a:t>-</a:t>
+            </a:r>
+            <a:r>
+              <a:rPr lang="en-US" altLang="ko-KR" dirty="0" smtClean="0">
+                <a:latin typeface="Calibri" charset="0"/>
+                <a:ea typeface="ＭＳ Ｐゴシック" charset="0"/>
+                <a:cs typeface="ＭＳ Ｐゴシック" charset="0"/>
+              </a:rPr>
+              <a:t>iv. </a:t>
+            </a:r>
+            <a:r>
+              <a:rPr lang="en-US" altLang="ko-KR" dirty="0">
+                <a:latin typeface="Calibri" charset="0"/>
+                <a:ea typeface="ＭＳ Ｐゴシック" charset="0"/>
+                <a:cs typeface="ＭＳ Ｐゴシック" charset="0"/>
+              </a:rPr>
+              <a:t>Post-alignment QC </a:t>
+            </a:r>
+            <a:r>
+              <a:rPr lang="en-US" altLang="ko-KR" dirty="0" smtClean="0">
+                <a:latin typeface="Calibri" charset="0"/>
+                <a:ea typeface="ＭＳ Ｐゴシック" charset="0"/>
+                <a:cs typeface="ＭＳ Ｐゴシック" charset="0"/>
+              </a:rPr>
+              <a:t>(</a:t>
+            </a:r>
+            <a:r>
+              <a:rPr lang="en-US" altLang="ko-KR" dirty="0" err="1" smtClean="0">
+                <a:latin typeface="Calibri" charset="0"/>
+                <a:ea typeface="ＭＳ Ｐゴシック" charset="0"/>
+                <a:cs typeface="ＭＳ Ｐゴシック" charset="0"/>
+              </a:rPr>
+              <a:t>RSeQC</a:t>
+            </a:r>
+            <a:r>
+              <a:rPr lang="en-US" altLang="ko-KR" dirty="0" smtClean="0">
+                <a:latin typeface="Calibri" charset="0"/>
+                <a:ea typeface="ＭＳ Ｐゴシック" charset="0"/>
+                <a:cs typeface="ＭＳ Ｐゴシック" charset="0"/>
+              </a:rPr>
+              <a:t>)</a:t>
+            </a:r>
+            <a:endParaRPr lang="en-US" dirty="0">
+              <a:latin typeface="Calibri" charset="0"/>
+              <a:ea typeface="ＭＳ Ｐゴシック" charset="0"/>
+            </a:endParaRPr>
+          </a:p>
+        </p:txBody>
+      </p:sp>
+      <p:pic>
+        <p:nvPicPr>
+          <p:cNvPr id="3" name="Picture 2"/>
+          <p:cNvPicPr>
+            <a:picLocks noChangeAspect="1"/>
+          </p:cNvPicPr>
+          <p:nvPr/>
+        </p:nvPicPr>
+        <p:blipFill>
+          <a:blip r:embed="rId2"/>
+          <a:stretch>
+            <a:fillRect/>
+          </a:stretch>
+        </p:blipFill>
+        <p:spPr>
+          <a:xfrm>
+            <a:off x="539552" y="1412776"/>
+            <a:ext cx="3721072" cy="3717032"/>
+          </a:xfrm>
+          <a:prstGeom prst="rect">
+            <a:avLst/>
+          </a:prstGeom>
+        </p:spPr>
+      </p:pic>
+      <p:pic>
+        <p:nvPicPr>
+          <p:cNvPr id="4" name="Picture 3"/>
+          <p:cNvPicPr>
+            <a:picLocks noChangeAspect="1"/>
+          </p:cNvPicPr>
+          <p:nvPr/>
+        </p:nvPicPr>
+        <p:blipFill>
+          <a:blip r:embed="rId3"/>
+          <a:stretch>
+            <a:fillRect/>
+          </a:stretch>
+        </p:blipFill>
+        <p:spPr>
+          <a:xfrm>
+            <a:off x="4620057" y="1412776"/>
+            <a:ext cx="3696359" cy="3672408"/>
+          </a:xfrm>
+          <a:prstGeom prst="rect">
+            <a:avLst/>
+          </a:prstGeom>
+        </p:spPr>
+      </p:pic>
+    </p:spTree>
+    <p:extLst>
+      <p:ext uri="{BB962C8B-B14F-4D97-AF65-F5344CB8AC3E}">
+        <p14:creationId xmlns:p14="http://schemas.microsoft.com/office/powerpoint/2010/main" val="4168161994"/>
+      </p:ext>
+    </p:extLst>
   </p:cSld>
   <p:clrMapOvr>
     <a:masterClrMapping/>

</xml_diff>